<commit_message>
worked on lectuer 20 multi slits
</commit_message>
<xml_diff>
--- a/Lecture_Slides/PH 123 Lecture 18.pptx
+++ b/Lecture_Slides/PH 123 Lecture 18.pptx
@@ -5,32 +5,43 @@
     <p:sldMasterId id="2147483648" r:id="rId1"/>
   </p:sldMasterIdLst>
   <p:notesMasterIdLst>
-    <p:notesMasterId r:id="rId25"/>
+    <p:notesMasterId r:id="rId36"/>
   </p:notesMasterIdLst>
   <p:sldIdLst>
-    <p:sldId id="270" r:id="rId2"/>
-    <p:sldId id="282" r:id="rId3"/>
-    <p:sldId id="283" r:id="rId4"/>
-    <p:sldId id="284" r:id="rId5"/>
-    <p:sldId id="285" r:id="rId6"/>
-    <p:sldId id="271" r:id="rId7"/>
-    <p:sldId id="272" r:id="rId8"/>
-    <p:sldId id="273" r:id="rId9"/>
-    <p:sldId id="274" r:id="rId10"/>
-    <p:sldId id="275" r:id="rId11"/>
-    <p:sldId id="286" r:id="rId12"/>
-    <p:sldId id="276" r:id="rId13"/>
-    <p:sldId id="287" r:id="rId14"/>
-    <p:sldId id="288" r:id="rId15"/>
-    <p:sldId id="277" r:id="rId16"/>
-    <p:sldId id="289" r:id="rId17"/>
-    <p:sldId id="278" r:id="rId18"/>
-    <p:sldId id="290" r:id="rId19"/>
-    <p:sldId id="291" r:id="rId20"/>
-    <p:sldId id="292" r:id="rId21"/>
-    <p:sldId id="279" r:id="rId22"/>
-    <p:sldId id="262" r:id="rId23"/>
-    <p:sldId id="263" r:id="rId24"/>
+    <p:sldId id="293" r:id="rId2"/>
+    <p:sldId id="270" r:id="rId3"/>
+    <p:sldId id="282" r:id="rId4"/>
+    <p:sldId id="283" r:id="rId5"/>
+    <p:sldId id="284" r:id="rId6"/>
+    <p:sldId id="285" r:id="rId7"/>
+    <p:sldId id="271" r:id="rId8"/>
+    <p:sldId id="272" r:id="rId9"/>
+    <p:sldId id="273" r:id="rId10"/>
+    <p:sldId id="274" r:id="rId11"/>
+    <p:sldId id="275" r:id="rId12"/>
+    <p:sldId id="286" r:id="rId13"/>
+    <p:sldId id="317" r:id="rId14"/>
+    <p:sldId id="318" r:id="rId15"/>
+    <p:sldId id="313" r:id="rId16"/>
+    <p:sldId id="320" r:id="rId17"/>
+    <p:sldId id="314" r:id="rId18"/>
+    <p:sldId id="315" r:id="rId19"/>
+    <p:sldId id="321" r:id="rId20"/>
+    <p:sldId id="322" r:id="rId21"/>
+    <p:sldId id="323" r:id="rId22"/>
+    <p:sldId id="294" r:id="rId23"/>
+    <p:sldId id="276" r:id="rId24"/>
+    <p:sldId id="287" r:id="rId25"/>
+    <p:sldId id="288" r:id="rId26"/>
+    <p:sldId id="277" r:id="rId27"/>
+    <p:sldId id="289" r:id="rId28"/>
+    <p:sldId id="278" r:id="rId29"/>
+    <p:sldId id="290" r:id="rId30"/>
+    <p:sldId id="291" r:id="rId31"/>
+    <p:sldId id="292" r:id="rId32"/>
+    <p:sldId id="279" r:id="rId33"/>
+    <p:sldId id="262" r:id="rId34"/>
+    <p:sldId id="263" r:id="rId35"/>
   </p:sldIdLst>
   <p:sldSz cx="9144000" cy="6858000" type="screen4x3"/>
   <p:notesSz cx="6858000" cy="9144000"/>
@@ -148,6 +159,129 @@
 </p:presentation>
 </file>
 
+<file path=ppt/revisionInfo.xml><?xml version="1.0" encoding="utf-8"?>
+<p1510:revInfo xmlns:a="http://schemas.openxmlformats.org/drawingml/2006/main" xmlns:r="http://schemas.openxmlformats.org/officeDocument/2006/relationships" xmlns:p1510="http://schemas.microsoft.com/office/powerpoint/2015/10/main">
+  <p1510:revLst>
+    <p1510:client id="{8884D5B3-316B-4CA9-AA82-2FAA99334111}" v="1" dt="2025-04-30T22:50:51.562"/>
+  </p1510:revLst>
+</p1510:revInfo>
+</file>
+
+<file path=ppt/changesInfos/changesInfo1.xml><?xml version="1.0" encoding="utf-8"?>
+<pc:chgInfo xmlns:a="http://schemas.openxmlformats.org/drawingml/2006/main" xmlns:r="http://schemas.openxmlformats.org/officeDocument/2006/relationships" xmlns:ac="http://schemas.microsoft.com/office/drawing/2013/main/command" xmlns:pc="http://schemas.microsoft.com/office/powerpoint/2013/main/command">
+  <pc:docChgLst>
+    <pc:chgData name="Lines, Todd" userId="afaf7c3a-e8aa-4568-882a-02ad8f9e19b0" providerId="ADAL" clId="{8884D5B3-316B-4CA9-AA82-2FAA99334111}"/>
+    <pc:docChg chg="custSel addSld modSld">
+      <pc:chgData name="Lines, Todd" userId="afaf7c3a-e8aa-4568-882a-02ad8f9e19b0" providerId="ADAL" clId="{8884D5B3-316B-4CA9-AA82-2FAA99334111}" dt="2025-04-30T22:50:51.550" v="16"/>
+      <pc:docMkLst>
+        <pc:docMk/>
+      </pc:docMkLst>
+      <pc:sldChg chg="modSp new mod">
+        <pc:chgData name="Lines, Todd" userId="afaf7c3a-e8aa-4568-882a-02ad8f9e19b0" providerId="ADAL" clId="{8884D5B3-316B-4CA9-AA82-2FAA99334111}" dt="2025-04-30T22:49:35.402" v="10" actId="20577"/>
+        <pc:sldMkLst>
+          <pc:docMk/>
+          <pc:sldMk cId="1961176737" sldId="293"/>
+        </pc:sldMkLst>
+        <pc:spChg chg="mod">
+          <ac:chgData name="Lines, Todd" userId="afaf7c3a-e8aa-4568-882a-02ad8f9e19b0" providerId="ADAL" clId="{8884D5B3-316B-4CA9-AA82-2FAA99334111}" dt="2025-04-30T22:49:35.402" v="10" actId="20577"/>
+          <ac:spMkLst>
+            <pc:docMk/>
+            <pc:sldMk cId="1961176737" sldId="293"/>
+            <ac:spMk id="2" creationId="{7FECADF4-F559-BA3C-D698-6E1C146A749B}"/>
+          </ac:spMkLst>
+        </pc:spChg>
+      </pc:sldChg>
+      <pc:sldChg chg="addSp modSp new mod modClrScheme chgLayout">
+        <pc:chgData name="Lines, Todd" userId="afaf7c3a-e8aa-4568-882a-02ad8f9e19b0" providerId="ADAL" clId="{8884D5B3-316B-4CA9-AA82-2FAA99334111}" dt="2025-04-30T22:50:23.418" v="15" actId="20577"/>
+        <pc:sldMkLst>
+          <pc:docMk/>
+          <pc:sldMk cId="2869578996" sldId="294"/>
+        </pc:sldMkLst>
+        <pc:spChg chg="add mod">
+          <ac:chgData name="Lines, Todd" userId="afaf7c3a-e8aa-4568-882a-02ad8f9e19b0" providerId="ADAL" clId="{8884D5B3-316B-4CA9-AA82-2FAA99334111}" dt="2025-04-30T22:50:23.418" v="15" actId="20577"/>
+          <ac:spMkLst>
+            <pc:docMk/>
+            <pc:sldMk cId="2869578996" sldId="294"/>
+            <ac:spMk id="2" creationId="{1062A867-10CE-CCEE-1AF5-5945F8C5CF81}"/>
+          </ac:spMkLst>
+        </pc:spChg>
+        <pc:spChg chg="add mod">
+          <ac:chgData name="Lines, Todd" userId="afaf7c3a-e8aa-4568-882a-02ad8f9e19b0" providerId="ADAL" clId="{8884D5B3-316B-4CA9-AA82-2FAA99334111}" dt="2025-04-30T22:50:21.371" v="12" actId="700"/>
+          <ac:spMkLst>
+            <pc:docMk/>
+            <pc:sldMk cId="2869578996" sldId="294"/>
+            <ac:spMk id="3" creationId="{B729B2DC-9D67-EA05-E426-34867E0B9300}"/>
+          </ac:spMkLst>
+        </pc:spChg>
+      </pc:sldChg>
+      <pc:sldChg chg="add">
+        <pc:chgData name="Lines, Todd" userId="afaf7c3a-e8aa-4568-882a-02ad8f9e19b0" providerId="ADAL" clId="{8884D5B3-316B-4CA9-AA82-2FAA99334111}" dt="2025-04-30T22:50:51.550" v="16"/>
+        <pc:sldMkLst>
+          <pc:docMk/>
+          <pc:sldMk cId="784141072" sldId="313"/>
+        </pc:sldMkLst>
+      </pc:sldChg>
+      <pc:sldChg chg="add">
+        <pc:chgData name="Lines, Todd" userId="afaf7c3a-e8aa-4568-882a-02ad8f9e19b0" providerId="ADAL" clId="{8884D5B3-316B-4CA9-AA82-2FAA99334111}" dt="2025-04-30T22:50:51.550" v="16"/>
+        <pc:sldMkLst>
+          <pc:docMk/>
+          <pc:sldMk cId="2007672557" sldId="314"/>
+        </pc:sldMkLst>
+      </pc:sldChg>
+      <pc:sldChg chg="add">
+        <pc:chgData name="Lines, Todd" userId="afaf7c3a-e8aa-4568-882a-02ad8f9e19b0" providerId="ADAL" clId="{8884D5B3-316B-4CA9-AA82-2FAA99334111}" dt="2025-04-30T22:50:51.550" v="16"/>
+        <pc:sldMkLst>
+          <pc:docMk/>
+          <pc:sldMk cId="873789064" sldId="315"/>
+        </pc:sldMkLst>
+      </pc:sldChg>
+      <pc:sldChg chg="add">
+        <pc:chgData name="Lines, Todd" userId="afaf7c3a-e8aa-4568-882a-02ad8f9e19b0" providerId="ADAL" clId="{8884D5B3-316B-4CA9-AA82-2FAA99334111}" dt="2025-04-30T22:50:51.550" v="16"/>
+        <pc:sldMkLst>
+          <pc:docMk/>
+          <pc:sldMk cId="3949916473" sldId="317"/>
+        </pc:sldMkLst>
+      </pc:sldChg>
+      <pc:sldChg chg="add">
+        <pc:chgData name="Lines, Todd" userId="afaf7c3a-e8aa-4568-882a-02ad8f9e19b0" providerId="ADAL" clId="{8884D5B3-316B-4CA9-AA82-2FAA99334111}" dt="2025-04-30T22:50:51.550" v="16"/>
+        <pc:sldMkLst>
+          <pc:docMk/>
+          <pc:sldMk cId="0" sldId="318"/>
+        </pc:sldMkLst>
+      </pc:sldChg>
+      <pc:sldChg chg="add">
+        <pc:chgData name="Lines, Todd" userId="afaf7c3a-e8aa-4568-882a-02ad8f9e19b0" providerId="ADAL" clId="{8884D5B3-316B-4CA9-AA82-2FAA99334111}" dt="2025-04-30T22:50:51.550" v="16"/>
+        <pc:sldMkLst>
+          <pc:docMk/>
+          <pc:sldMk cId="2905864846" sldId="320"/>
+        </pc:sldMkLst>
+      </pc:sldChg>
+      <pc:sldChg chg="add">
+        <pc:chgData name="Lines, Todd" userId="afaf7c3a-e8aa-4568-882a-02ad8f9e19b0" providerId="ADAL" clId="{8884D5B3-316B-4CA9-AA82-2FAA99334111}" dt="2025-04-30T22:50:51.550" v="16"/>
+        <pc:sldMkLst>
+          <pc:docMk/>
+          <pc:sldMk cId="0" sldId="321"/>
+        </pc:sldMkLst>
+      </pc:sldChg>
+      <pc:sldChg chg="add">
+        <pc:chgData name="Lines, Todd" userId="afaf7c3a-e8aa-4568-882a-02ad8f9e19b0" providerId="ADAL" clId="{8884D5B3-316B-4CA9-AA82-2FAA99334111}" dt="2025-04-30T22:50:51.550" v="16"/>
+        <pc:sldMkLst>
+          <pc:docMk/>
+          <pc:sldMk cId="0" sldId="322"/>
+        </pc:sldMkLst>
+      </pc:sldChg>
+      <pc:sldChg chg="add">
+        <pc:chgData name="Lines, Todd" userId="afaf7c3a-e8aa-4568-882a-02ad8f9e19b0" providerId="ADAL" clId="{8884D5B3-316B-4CA9-AA82-2FAA99334111}" dt="2025-04-30T22:50:51.550" v="16"/>
+        <pc:sldMkLst>
+          <pc:docMk/>
+          <pc:sldMk cId="0" sldId="323"/>
+        </pc:sldMkLst>
+      </pc:sldChg>
+    </pc:docChg>
+  </pc:docChgLst>
+</pc:chgInfo>
+</file>
+
 <file path=ppt/notesMasters/notesMaster1.xml><?xml version="1.0" encoding="utf-8"?>
 <p:notesMaster xmlns:a="http://schemas.openxmlformats.org/drawingml/2006/main" xmlns:r="http://schemas.openxmlformats.org/officeDocument/2006/relationships" xmlns:p="http://schemas.openxmlformats.org/presentationml/2006/main">
   <p:cSld>
@@ -230,7 +364,7 @@
           <a:p>
             <a:fld id="{8B442B61-E92B-448B-901B-F4BC73FBCE5B}" type="datetimeFigureOut">
               <a:rPr lang="en-US" smtClean="0"/>
-              <a:t>2/15/2017</a:t>
+              <a:t>4/30/2025</a:t>
             </a:fld>
             <a:endParaRPr lang="en-US"/>
           </a:p>
@@ -296,38 +430,37 @@
           <a:p>
             <a:pPr lvl="0"/>
             <a:r>
-              <a:rPr lang="en-US" smtClean="0"/>
+              <a:rPr lang="en-US"/>
               <a:t>Click to edit Master text styles</a:t>
             </a:r>
           </a:p>
           <a:p>
             <a:pPr lvl="1"/>
             <a:r>
-              <a:rPr lang="en-US" smtClean="0"/>
+              <a:rPr lang="en-US"/>
               <a:t>Second level</a:t>
             </a:r>
           </a:p>
           <a:p>
             <a:pPr lvl="2"/>
             <a:r>
-              <a:rPr lang="en-US" smtClean="0"/>
+              <a:rPr lang="en-US"/>
               <a:t>Third level</a:t>
             </a:r>
           </a:p>
           <a:p>
             <a:pPr lvl="3"/>
             <a:r>
-              <a:rPr lang="en-US" smtClean="0"/>
+              <a:rPr lang="en-US"/>
               <a:t>Fourth level</a:t>
             </a:r>
           </a:p>
           <a:p>
             <a:pPr lvl="4"/>
             <a:r>
-              <a:rPr lang="en-US" smtClean="0"/>
+              <a:rPr lang="en-US"/>
               <a:t>Fifth level</a:t>
             </a:r>
-            <a:endParaRPr lang="en-US"/>
           </a:p>
         </p:txBody>
       </p:sp>
@@ -532,9 +665,9 @@
             <a:fld id="{C761B540-B85A-48EC-9EF6-9AE02BDF169E}" type="slidenum">
               <a:rPr lang="en-US" smtClean="0"/>
               <a:pPr/>
-              <a:t>16</a:t>
+              <a:t>27</a:t>
             </a:fld>
-            <a:endParaRPr lang="en-US" smtClean="0"/>
+            <a:endParaRPr lang="en-US"/>
           </a:p>
         </p:txBody>
       </p:sp>
@@ -574,13 +707,13 @@
           <a:lstStyle/>
           <a:p>
             <a:r>
-              <a:rPr lang="en-US" smtClean="0"/>
+              <a:rPr lang="en-US"/>
               <a:t>neuro4e-fig-11-02-0.jpg</a:t>
             </a:r>
             <a:br>
-              <a:rPr lang="en-US" smtClean="0"/>
+              <a:rPr lang="en-US"/>
             </a:br>
-            <a:endParaRPr lang="en-US" smtClean="0"/>
+            <a:endParaRPr lang="en-US"/>
           </a:p>
         </p:txBody>
       </p:sp>
@@ -634,9 +767,9 @@
             <a:fld id="{BAFE06D5-8120-4702-8799-49873C1A47AF}" type="slidenum">
               <a:rPr lang="en-US" smtClean="0"/>
               <a:pPr/>
-              <a:t>18</a:t>
+              <a:t>29</a:t>
             </a:fld>
-            <a:endParaRPr lang="en-US" smtClean="0"/>
+            <a:endParaRPr lang="en-US"/>
           </a:p>
         </p:txBody>
       </p:sp>
@@ -676,13 +809,13 @@
           <a:lstStyle/>
           <a:p>
             <a:r>
-              <a:rPr lang="en-US" smtClean="0"/>
+              <a:rPr lang="en-US"/>
               <a:t>neuro4e-box-11-a(1)-0.jpg</a:t>
             </a:r>
             <a:br>
-              <a:rPr lang="en-US" smtClean="0"/>
+              <a:rPr lang="en-US"/>
             </a:br>
-            <a:endParaRPr lang="en-US" smtClean="0"/>
+            <a:endParaRPr lang="en-US"/>
           </a:p>
         </p:txBody>
       </p:sp>
@@ -736,9 +869,9 @@
             <a:fld id="{0F9BA69C-0CAC-4F69-8A3E-75C9C4CFA572}" type="slidenum">
               <a:rPr lang="en-US" smtClean="0"/>
               <a:pPr/>
-              <a:t>20</a:t>
+              <a:t>31</a:t>
             </a:fld>
-            <a:endParaRPr lang="en-US" smtClean="0"/>
+            <a:endParaRPr lang="en-US"/>
           </a:p>
         </p:txBody>
       </p:sp>
@@ -778,13 +911,13 @@
           <a:lstStyle/>
           <a:p>
             <a:r>
-              <a:rPr lang="en-US" smtClean="0"/>
+              <a:rPr lang="en-US"/>
               <a:t>neuro4e-box-11-a(2)-0.jpg</a:t>
             </a:r>
             <a:br>
-              <a:rPr lang="en-US" smtClean="0"/>
+              <a:rPr lang="en-US"/>
             </a:br>
-            <a:endParaRPr lang="en-US" smtClean="0"/>
+            <a:endParaRPr lang="en-US"/>
           </a:p>
         </p:txBody>
       </p:sp>
@@ -839,10 +972,9 @@
           <a:lstStyle/>
           <a:p>
             <a:r>
-              <a:rPr lang="en-US" smtClean="0"/>
+              <a:rPr lang="en-US"/>
               <a:t>Click to edit Master title style</a:t>
             </a:r>
-            <a:endParaRPr lang="en-US"/>
           </a:p>
         </p:txBody>
       </p:sp>
@@ -958,10 +1090,9 @@
           </a:lstStyle>
           <a:p>
             <a:r>
-              <a:rPr lang="en-US" smtClean="0"/>
+              <a:rPr lang="en-US"/>
               <a:t>Click to edit Master subtitle style</a:t>
             </a:r>
-            <a:endParaRPr lang="en-US"/>
           </a:p>
         </p:txBody>
       </p:sp>
@@ -982,7 +1113,7 @@
           <a:p>
             <a:fld id="{DE20BF63-FE06-4C95-BA80-0CD72D356A6A}" type="datetimeFigureOut">
               <a:rPr lang="en-US" smtClean="0"/>
-              <a:t>2/15/2017</a:t>
+              <a:t>4/30/2025</a:t>
             </a:fld>
             <a:endParaRPr lang="en-US"/>
           </a:p>
@@ -1071,10 +1202,9 @@
           <a:lstStyle/>
           <a:p>
             <a:r>
-              <a:rPr lang="en-US" smtClean="0"/>
+              <a:rPr lang="en-US"/>
               <a:t>Click to edit Master title style</a:t>
             </a:r>
-            <a:endParaRPr lang="en-US"/>
           </a:p>
         </p:txBody>
       </p:sp>
@@ -1095,38 +1225,37 @@
           <a:p>
             <a:pPr lvl="0"/>
             <a:r>
-              <a:rPr lang="en-US" smtClean="0"/>
+              <a:rPr lang="en-US"/>
               <a:t>Click to edit Master text styles</a:t>
             </a:r>
           </a:p>
           <a:p>
             <a:pPr lvl="1"/>
             <a:r>
-              <a:rPr lang="en-US" smtClean="0"/>
+              <a:rPr lang="en-US"/>
               <a:t>Second level</a:t>
             </a:r>
           </a:p>
           <a:p>
             <a:pPr lvl="2"/>
             <a:r>
-              <a:rPr lang="en-US" smtClean="0"/>
+              <a:rPr lang="en-US"/>
               <a:t>Third level</a:t>
             </a:r>
           </a:p>
           <a:p>
             <a:pPr lvl="3"/>
             <a:r>
-              <a:rPr lang="en-US" smtClean="0"/>
+              <a:rPr lang="en-US"/>
               <a:t>Fourth level</a:t>
             </a:r>
           </a:p>
           <a:p>
             <a:pPr lvl="4"/>
             <a:r>
-              <a:rPr lang="en-US" smtClean="0"/>
+              <a:rPr lang="en-US"/>
               <a:t>Fifth level</a:t>
             </a:r>
-            <a:endParaRPr lang="en-US"/>
           </a:p>
         </p:txBody>
       </p:sp>
@@ -1147,7 +1276,7 @@
           <a:p>
             <a:fld id="{DE20BF63-FE06-4C95-BA80-0CD72D356A6A}" type="datetimeFigureOut">
               <a:rPr lang="en-US" smtClean="0"/>
-              <a:t>2/15/2017</a:t>
+              <a:t>4/30/2025</a:t>
             </a:fld>
             <a:endParaRPr lang="en-US"/>
           </a:p>
@@ -1241,10 +1370,9 @@
           <a:lstStyle/>
           <a:p>
             <a:r>
-              <a:rPr lang="en-US" smtClean="0"/>
+              <a:rPr lang="en-US"/>
               <a:t>Click to edit Master title style</a:t>
             </a:r>
-            <a:endParaRPr lang="en-US"/>
           </a:p>
         </p:txBody>
       </p:sp>
@@ -1270,38 +1398,37 @@
           <a:p>
             <a:pPr lvl="0"/>
             <a:r>
-              <a:rPr lang="en-US" smtClean="0"/>
+              <a:rPr lang="en-US"/>
               <a:t>Click to edit Master text styles</a:t>
             </a:r>
           </a:p>
           <a:p>
             <a:pPr lvl="1"/>
             <a:r>
-              <a:rPr lang="en-US" smtClean="0"/>
+              <a:rPr lang="en-US"/>
               <a:t>Second level</a:t>
             </a:r>
           </a:p>
           <a:p>
             <a:pPr lvl="2"/>
             <a:r>
-              <a:rPr lang="en-US" smtClean="0"/>
+              <a:rPr lang="en-US"/>
               <a:t>Third level</a:t>
             </a:r>
           </a:p>
           <a:p>
             <a:pPr lvl="3"/>
             <a:r>
-              <a:rPr lang="en-US" smtClean="0"/>
+              <a:rPr lang="en-US"/>
               <a:t>Fourth level</a:t>
             </a:r>
           </a:p>
           <a:p>
             <a:pPr lvl="4"/>
             <a:r>
-              <a:rPr lang="en-US" smtClean="0"/>
+              <a:rPr lang="en-US"/>
               <a:t>Fifth level</a:t>
             </a:r>
-            <a:endParaRPr lang="en-US"/>
           </a:p>
         </p:txBody>
       </p:sp>
@@ -1322,7 +1449,7 @@
           <a:p>
             <a:fld id="{DE20BF63-FE06-4C95-BA80-0CD72D356A6A}" type="datetimeFigureOut">
               <a:rPr lang="en-US" smtClean="0"/>
-              <a:t>2/15/2017</a:t>
+              <a:t>4/30/2025</a:t>
             </a:fld>
             <a:endParaRPr lang="en-US"/>
           </a:p>
@@ -1416,10 +1543,9 @@
           <a:lstStyle/>
           <a:p>
             <a:r>
-              <a:rPr lang="en-US" smtClean="0"/>
+              <a:rPr lang="en-US"/>
               <a:t>Click to edit Master title style</a:t>
             </a:r>
-            <a:endParaRPr lang="en-US"/>
           </a:p>
         </p:txBody>
       </p:sp>
@@ -1445,38 +1571,37 @@
           <a:p>
             <a:pPr lvl="0"/>
             <a:r>
-              <a:rPr lang="en-US" smtClean="0"/>
+              <a:rPr lang="en-US"/>
               <a:t>Click to edit Master text styles</a:t>
             </a:r>
           </a:p>
           <a:p>
             <a:pPr lvl="1"/>
             <a:r>
-              <a:rPr lang="en-US" smtClean="0"/>
+              <a:rPr lang="en-US"/>
               <a:t>Second level</a:t>
             </a:r>
           </a:p>
           <a:p>
             <a:pPr lvl="2"/>
             <a:r>
-              <a:rPr lang="en-US" smtClean="0"/>
+              <a:rPr lang="en-US"/>
               <a:t>Third level</a:t>
             </a:r>
           </a:p>
           <a:p>
             <a:pPr lvl="3"/>
             <a:r>
-              <a:rPr lang="en-US" smtClean="0"/>
+              <a:rPr lang="en-US"/>
               <a:t>Fourth level</a:t>
             </a:r>
           </a:p>
           <a:p>
             <a:pPr lvl="4"/>
             <a:r>
-              <a:rPr lang="en-US" smtClean="0"/>
+              <a:rPr lang="en-US"/>
               <a:t>Fifth level</a:t>
             </a:r>
-            <a:endParaRPr lang="en-US"/>
           </a:p>
         </p:txBody>
       </p:sp>
@@ -1645,10 +1770,9 @@
           <a:lstStyle/>
           <a:p>
             <a:r>
-              <a:rPr lang="en-US" smtClean="0"/>
+              <a:rPr lang="en-US"/>
               <a:t>Click to edit Master title style</a:t>
             </a:r>
-            <a:endParaRPr lang="en-US"/>
           </a:p>
         </p:txBody>
       </p:sp>
@@ -1669,38 +1793,37 @@
           <a:p>
             <a:pPr lvl="0"/>
             <a:r>
-              <a:rPr lang="en-US" smtClean="0"/>
+              <a:rPr lang="en-US"/>
               <a:t>Click to edit Master text styles</a:t>
             </a:r>
           </a:p>
           <a:p>
             <a:pPr lvl="1"/>
             <a:r>
-              <a:rPr lang="en-US" smtClean="0"/>
+              <a:rPr lang="en-US"/>
               <a:t>Second level</a:t>
             </a:r>
           </a:p>
           <a:p>
             <a:pPr lvl="2"/>
             <a:r>
-              <a:rPr lang="en-US" smtClean="0"/>
+              <a:rPr lang="en-US"/>
               <a:t>Third level</a:t>
             </a:r>
           </a:p>
           <a:p>
             <a:pPr lvl="3"/>
             <a:r>
-              <a:rPr lang="en-US" smtClean="0"/>
+              <a:rPr lang="en-US"/>
               <a:t>Fourth level</a:t>
             </a:r>
           </a:p>
           <a:p>
             <a:pPr lvl="4"/>
             <a:r>
-              <a:rPr lang="en-US" smtClean="0"/>
+              <a:rPr lang="en-US"/>
               <a:t>Fifth level</a:t>
             </a:r>
-            <a:endParaRPr lang="en-US"/>
           </a:p>
         </p:txBody>
       </p:sp>
@@ -1721,7 +1844,7 @@
           <a:p>
             <a:fld id="{DE20BF63-FE06-4C95-BA80-0CD72D356A6A}" type="datetimeFigureOut">
               <a:rPr lang="en-US" smtClean="0"/>
-              <a:t>2/15/2017</a:t>
+              <a:t>4/30/2025</a:t>
             </a:fld>
             <a:endParaRPr lang="en-US"/>
           </a:p>
@@ -1819,10 +1942,9 @@
           </a:lstStyle>
           <a:p>
             <a:r>
-              <a:rPr lang="en-US" smtClean="0"/>
+              <a:rPr lang="en-US"/>
               <a:t>Click to edit Master title style</a:t>
             </a:r>
-            <a:endParaRPr lang="en-US"/>
           </a:p>
         </p:txBody>
       </p:sp>
@@ -1939,7 +2061,7 @@
           <a:p>
             <a:pPr lvl="0"/>
             <a:r>
-              <a:rPr lang="en-US" smtClean="0"/>
+              <a:rPr lang="en-US"/>
               <a:t>Click to edit Master text styles</a:t>
             </a:r>
           </a:p>
@@ -1962,7 +2084,7 @@
           <a:p>
             <a:fld id="{DE20BF63-FE06-4C95-BA80-0CD72D356A6A}" type="datetimeFigureOut">
               <a:rPr lang="en-US" smtClean="0"/>
-              <a:t>2/15/2017</a:t>
+              <a:t>4/30/2025</a:t>
             </a:fld>
             <a:endParaRPr lang="en-US"/>
           </a:p>
@@ -2051,10 +2173,9 @@
           <a:lstStyle/>
           <a:p>
             <a:r>
-              <a:rPr lang="en-US" smtClean="0"/>
+              <a:rPr lang="en-US"/>
               <a:t>Click to edit Master title style</a:t>
             </a:r>
-            <a:endParaRPr lang="en-US"/>
           </a:p>
         </p:txBody>
       </p:sp>
@@ -2108,38 +2229,37 @@
           <a:p>
             <a:pPr lvl="0"/>
             <a:r>
-              <a:rPr lang="en-US" smtClean="0"/>
+              <a:rPr lang="en-US"/>
               <a:t>Click to edit Master text styles</a:t>
             </a:r>
           </a:p>
           <a:p>
             <a:pPr lvl="1"/>
             <a:r>
-              <a:rPr lang="en-US" smtClean="0"/>
+              <a:rPr lang="en-US"/>
               <a:t>Second level</a:t>
             </a:r>
           </a:p>
           <a:p>
             <a:pPr lvl="2"/>
             <a:r>
-              <a:rPr lang="en-US" smtClean="0"/>
+              <a:rPr lang="en-US"/>
               <a:t>Third level</a:t>
             </a:r>
           </a:p>
           <a:p>
             <a:pPr lvl="3"/>
             <a:r>
-              <a:rPr lang="en-US" smtClean="0"/>
+              <a:rPr lang="en-US"/>
               <a:t>Fourth level</a:t>
             </a:r>
           </a:p>
           <a:p>
             <a:pPr lvl="4"/>
             <a:r>
-              <a:rPr lang="en-US" smtClean="0"/>
+              <a:rPr lang="en-US"/>
               <a:t>Fifth level</a:t>
             </a:r>
-            <a:endParaRPr lang="en-US"/>
           </a:p>
         </p:txBody>
       </p:sp>
@@ -2193,38 +2313,37 @@
           <a:p>
             <a:pPr lvl="0"/>
             <a:r>
-              <a:rPr lang="en-US" smtClean="0"/>
+              <a:rPr lang="en-US"/>
               <a:t>Click to edit Master text styles</a:t>
             </a:r>
           </a:p>
           <a:p>
             <a:pPr lvl="1"/>
             <a:r>
-              <a:rPr lang="en-US" smtClean="0"/>
+              <a:rPr lang="en-US"/>
               <a:t>Second level</a:t>
             </a:r>
           </a:p>
           <a:p>
             <a:pPr lvl="2"/>
             <a:r>
-              <a:rPr lang="en-US" smtClean="0"/>
+              <a:rPr lang="en-US"/>
               <a:t>Third level</a:t>
             </a:r>
           </a:p>
           <a:p>
             <a:pPr lvl="3"/>
             <a:r>
-              <a:rPr lang="en-US" smtClean="0"/>
+              <a:rPr lang="en-US"/>
               <a:t>Fourth level</a:t>
             </a:r>
           </a:p>
           <a:p>
             <a:pPr lvl="4"/>
             <a:r>
-              <a:rPr lang="en-US" smtClean="0"/>
+              <a:rPr lang="en-US"/>
               <a:t>Fifth level</a:t>
             </a:r>
-            <a:endParaRPr lang="en-US"/>
           </a:p>
         </p:txBody>
       </p:sp>
@@ -2245,7 +2364,7 @@
           <a:p>
             <a:fld id="{DE20BF63-FE06-4C95-BA80-0CD72D356A6A}" type="datetimeFigureOut">
               <a:rPr lang="en-US" smtClean="0"/>
-              <a:t>2/15/2017</a:t>
+              <a:t>4/30/2025</a:t>
             </a:fld>
             <a:endParaRPr lang="en-US"/>
           </a:p>
@@ -2338,10 +2457,9 @@
           </a:lstStyle>
           <a:p>
             <a:r>
-              <a:rPr lang="en-US" smtClean="0"/>
+              <a:rPr lang="en-US"/>
               <a:t>Click to edit Master title style</a:t>
             </a:r>
-            <a:endParaRPr lang="en-US"/>
           </a:p>
         </p:txBody>
       </p:sp>
@@ -2404,7 +2522,7 @@
           <a:p>
             <a:pPr lvl="0"/>
             <a:r>
-              <a:rPr lang="en-US" smtClean="0"/>
+              <a:rPr lang="en-US"/>
               <a:t>Click to edit Master text styles</a:t>
             </a:r>
           </a:p>
@@ -2460,38 +2578,37 @@
           <a:p>
             <a:pPr lvl="0"/>
             <a:r>
-              <a:rPr lang="en-US" smtClean="0"/>
+              <a:rPr lang="en-US"/>
               <a:t>Click to edit Master text styles</a:t>
             </a:r>
           </a:p>
           <a:p>
             <a:pPr lvl="1"/>
             <a:r>
-              <a:rPr lang="en-US" smtClean="0"/>
+              <a:rPr lang="en-US"/>
               <a:t>Second level</a:t>
             </a:r>
           </a:p>
           <a:p>
             <a:pPr lvl="2"/>
             <a:r>
-              <a:rPr lang="en-US" smtClean="0"/>
+              <a:rPr lang="en-US"/>
               <a:t>Third level</a:t>
             </a:r>
           </a:p>
           <a:p>
             <a:pPr lvl="3"/>
             <a:r>
-              <a:rPr lang="en-US" smtClean="0"/>
+              <a:rPr lang="en-US"/>
               <a:t>Fourth level</a:t>
             </a:r>
           </a:p>
           <a:p>
             <a:pPr lvl="4"/>
             <a:r>
-              <a:rPr lang="en-US" smtClean="0"/>
+              <a:rPr lang="en-US"/>
               <a:t>Fifth level</a:t>
             </a:r>
-            <a:endParaRPr lang="en-US"/>
           </a:p>
         </p:txBody>
       </p:sp>
@@ -2554,7 +2671,7 @@
           <a:p>
             <a:pPr lvl="0"/>
             <a:r>
-              <a:rPr lang="en-US" smtClean="0"/>
+              <a:rPr lang="en-US"/>
               <a:t>Click to edit Master text styles</a:t>
             </a:r>
           </a:p>
@@ -2610,38 +2727,37 @@
           <a:p>
             <a:pPr lvl="0"/>
             <a:r>
-              <a:rPr lang="en-US" smtClean="0"/>
+              <a:rPr lang="en-US"/>
               <a:t>Click to edit Master text styles</a:t>
             </a:r>
           </a:p>
           <a:p>
             <a:pPr lvl="1"/>
             <a:r>
-              <a:rPr lang="en-US" smtClean="0"/>
+              <a:rPr lang="en-US"/>
               <a:t>Second level</a:t>
             </a:r>
           </a:p>
           <a:p>
             <a:pPr lvl="2"/>
             <a:r>
-              <a:rPr lang="en-US" smtClean="0"/>
+              <a:rPr lang="en-US"/>
               <a:t>Third level</a:t>
             </a:r>
           </a:p>
           <a:p>
             <a:pPr lvl="3"/>
             <a:r>
-              <a:rPr lang="en-US" smtClean="0"/>
+              <a:rPr lang="en-US"/>
               <a:t>Fourth level</a:t>
             </a:r>
           </a:p>
           <a:p>
             <a:pPr lvl="4"/>
             <a:r>
-              <a:rPr lang="en-US" smtClean="0"/>
+              <a:rPr lang="en-US"/>
               <a:t>Fifth level</a:t>
             </a:r>
-            <a:endParaRPr lang="en-US"/>
           </a:p>
         </p:txBody>
       </p:sp>
@@ -2662,7 +2778,7 @@
           <a:p>
             <a:fld id="{DE20BF63-FE06-4C95-BA80-0CD72D356A6A}" type="datetimeFigureOut">
               <a:rPr lang="en-US" smtClean="0"/>
-              <a:t>2/15/2017</a:t>
+              <a:t>4/30/2025</a:t>
             </a:fld>
             <a:endParaRPr lang="en-US"/>
           </a:p>
@@ -2751,10 +2867,9 @@
           <a:lstStyle/>
           <a:p>
             <a:r>
-              <a:rPr lang="en-US" smtClean="0"/>
+              <a:rPr lang="en-US"/>
               <a:t>Click to edit Master title style</a:t>
             </a:r>
-            <a:endParaRPr lang="en-US"/>
           </a:p>
         </p:txBody>
       </p:sp>
@@ -2775,7 +2890,7 @@
           <a:p>
             <a:fld id="{DE20BF63-FE06-4C95-BA80-0CD72D356A6A}" type="datetimeFigureOut">
               <a:rPr lang="en-US" smtClean="0"/>
-              <a:t>2/15/2017</a:t>
+              <a:t>4/30/2025</a:t>
             </a:fld>
             <a:endParaRPr lang="en-US"/>
           </a:p>
@@ -2865,7 +2980,7 @@
           <a:p>
             <a:fld id="{DE20BF63-FE06-4C95-BA80-0CD72D356A6A}" type="datetimeFigureOut">
               <a:rPr lang="en-US" smtClean="0"/>
-              <a:t>2/15/2017</a:t>
+              <a:t>4/30/2025</a:t>
             </a:fld>
             <a:endParaRPr lang="en-US"/>
           </a:p>
@@ -2963,10 +3078,9 @@
           </a:lstStyle>
           <a:p>
             <a:r>
-              <a:rPr lang="en-US" smtClean="0"/>
+              <a:rPr lang="en-US"/>
               <a:t>Click to edit Master title style</a:t>
             </a:r>
-            <a:endParaRPr lang="en-US"/>
           </a:p>
         </p:txBody>
       </p:sp>
@@ -3020,38 +3134,37 @@
           <a:p>
             <a:pPr lvl="0"/>
             <a:r>
-              <a:rPr lang="en-US" smtClean="0"/>
+              <a:rPr lang="en-US"/>
               <a:t>Click to edit Master text styles</a:t>
             </a:r>
           </a:p>
           <a:p>
             <a:pPr lvl="1"/>
             <a:r>
-              <a:rPr lang="en-US" smtClean="0"/>
+              <a:rPr lang="en-US"/>
               <a:t>Second level</a:t>
             </a:r>
           </a:p>
           <a:p>
             <a:pPr lvl="2"/>
             <a:r>
-              <a:rPr lang="en-US" smtClean="0"/>
+              <a:rPr lang="en-US"/>
               <a:t>Third level</a:t>
             </a:r>
           </a:p>
           <a:p>
             <a:pPr lvl="3"/>
             <a:r>
-              <a:rPr lang="en-US" smtClean="0"/>
+              <a:rPr lang="en-US"/>
               <a:t>Fourth level</a:t>
             </a:r>
           </a:p>
           <a:p>
             <a:pPr lvl="4"/>
             <a:r>
-              <a:rPr lang="en-US" smtClean="0"/>
+              <a:rPr lang="en-US"/>
               <a:t>Fifth level</a:t>
             </a:r>
-            <a:endParaRPr lang="en-US"/>
           </a:p>
         </p:txBody>
       </p:sp>
@@ -3114,7 +3227,7 @@
           <a:p>
             <a:pPr lvl="0"/>
             <a:r>
-              <a:rPr lang="en-US" smtClean="0"/>
+              <a:rPr lang="en-US"/>
               <a:t>Click to edit Master text styles</a:t>
             </a:r>
           </a:p>
@@ -3137,7 +3250,7 @@
           <a:p>
             <a:fld id="{DE20BF63-FE06-4C95-BA80-0CD72D356A6A}" type="datetimeFigureOut">
               <a:rPr lang="en-US" smtClean="0"/>
-              <a:t>2/15/2017</a:t>
+              <a:t>4/30/2025</a:t>
             </a:fld>
             <a:endParaRPr lang="en-US"/>
           </a:p>
@@ -3235,10 +3348,9 @@
           </a:lstStyle>
           <a:p>
             <a:r>
-              <a:rPr lang="en-US" smtClean="0"/>
+              <a:rPr lang="en-US"/>
               <a:t>Click to edit Master title style</a:t>
             </a:r>
-            <a:endParaRPr lang="en-US"/>
           </a:p>
         </p:txBody>
       </p:sp>
@@ -3362,7 +3474,7 @@
           <a:p>
             <a:pPr lvl="0"/>
             <a:r>
-              <a:rPr lang="en-US" smtClean="0"/>
+              <a:rPr lang="en-US"/>
               <a:t>Click to edit Master text styles</a:t>
             </a:r>
           </a:p>
@@ -3385,7 +3497,7 @@
           <a:p>
             <a:fld id="{DE20BF63-FE06-4C95-BA80-0CD72D356A6A}" type="datetimeFigureOut">
               <a:rPr lang="en-US" smtClean="0"/>
-              <a:t>2/15/2017</a:t>
+              <a:t>4/30/2025</a:t>
             </a:fld>
             <a:endParaRPr lang="en-US"/>
           </a:p>
@@ -3489,10 +3601,9 @@
           <a:lstStyle/>
           <a:p>
             <a:r>
-              <a:rPr lang="en-US" smtClean="0"/>
+              <a:rPr lang="en-US"/>
               <a:t>Click to edit Master title style</a:t>
             </a:r>
-            <a:endParaRPr lang="en-US"/>
           </a:p>
         </p:txBody>
       </p:sp>
@@ -3523,38 +3634,37 @@
           <a:p>
             <a:pPr lvl="0"/>
             <a:r>
-              <a:rPr lang="en-US" smtClean="0"/>
+              <a:rPr lang="en-US"/>
               <a:t>Click to edit Master text styles</a:t>
             </a:r>
           </a:p>
           <a:p>
             <a:pPr lvl="1"/>
             <a:r>
-              <a:rPr lang="en-US" smtClean="0"/>
+              <a:rPr lang="en-US"/>
               <a:t>Second level</a:t>
             </a:r>
           </a:p>
           <a:p>
             <a:pPr lvl="2"/>
             <a:r>
-              <a:rPr lang="en-US" smtClean="0"/>
+              <a:rPr lang="en-US"/>
               <a:t>Third level</a:t>
             </a:r>
           </a:p>
           <a:p>
             <a:pPr lvl="3"/>
             <a:r>
-              <a:rPr lang="en-US" smtClean="0"/>
+              <a:rPr lang="en-US"/>
               <a:t>Fourth level</a:t>
             </a:r>
           </a:p>
           <a:p>
             <a:pPr lvl="4"/>
             <a:r>
-              <a:rPr lang="en-US" smtClean="0"/>
+              <a:rPr lang="en-US"/>
               <a:t>Fifth level</a:t>
             </a:r>
-            <a:endParaRPr lang="en-US"/>
           </a:p>
         </p:txBody>
       </p:sp>
@@ -3593,7 +3703,7 @@
           <a:p>
             <a:fld id="{DE20BF63-FE06-4C95-BA80-0CD72D356A6A}" type="datetimeFigureOut">
               <a:rPr lang="en-US" smtClean="0"/>
-              <a:t>2/15/2017</a:t>
+              <a:t>4/30/2025</a:t>
             </a:fld>
             <a:endParaRPr lang="en-US"/>
           </a:p>
@@ -3966,6 +4076,1633 @@
       </p:grpSpPr>
       <p:sp>
         <p:nvSpPr>
+          <p:cNvPr id="2" name="Title 1">
+            <a:extLst>
+              <a:ext uri="{FF2B5EF4-FFF2-40B4-BE49-F238E27FC236}">
+                <a16:creationId xmlns:a16="http://schemas.microsoft.com/office/drawing/2014/main" id="{7FECADF4-F559-BA3C-D698-6E1C146A749B}"/>
+              </a:ext>
+            </a:extLst>
+          </p:cNvPr>
+          <p:cNvSpPr>
+            <a:spLocks noGrp="1"/>
+          </p:cNvSpPr>
+          <p:nvPr>
+            <p:ph type="ctrTitle"/>
+          </p:nvPr>
+        </p:nvSpPr>
+        <p:spPr/>
+        <p:txBody>
+          <a:bodyPr/>
+          <a:lstStyle/>
+          <a:p>
+            <a:r>
+              <a:rPr lang="en-US" dirty="0"/>
+              <a:t>Lecture 18</a:t>
+            </a:r>
+          </a:p>
+        </p:txBody>
+      </p:sp>
+      <p:sp>
+        <p:nvSpPr>
+          <p:cNvPr id="3" name="Subtitle 2">
+            <a:extLst>
+              <a:ext uri="{FF2B5EF4-FFF2-40B4-BE49-F238E27FC236}">
+                <a16:creationId xmlns:a16="http://schemas.microsoft.com/office/drawing/2014/main" id="{C8C20597-3A2F-FA81-A812-6BC1F5E5294E}"/>
+              </a:ext>
+            </a:extLst>
+          </p:cNvPr>
+          <p:cNvSpPr>
+            <a:spLocks noGrp="1"/>
+          </p:cNvSpPr>
+          <p:nvPr>
+            <p:ph type="subTitle" idx="1"/>
+          </p:nvPr>
+        </p:nvSpPr>
+        <p:spPr/>
+        <p:txBody>
+          <a:bodyPr/>
+          <a:lstStyle/>
+          <a:p>
+            <a:endParaRPr lang="en-US"/>
+          </a:p>
+        </p:txBody>
+      </p:sp>
+    </p:spTree>
+    <p:extLst>
+      <p:ext uri="{BB962C8B-B14F-4D97-AF65-F5344CB8AC3E}">
+        <p14:creationId xmlns:p14="http://schemas.microsoft.com/office/powerpoint/2010/main" val="1961176737"/>
+      </p:ext>
+    </p:extLst>
+  </p:cSld>
+  <p:clrMapOvr>
+    <a:masterClrMapping/>
+  </p:clrMapOvr>
+</p:sld>
+</file>
+
+<file path=ppt/slides/slide10.xml><?xml version="1.0" encoding="utf-8"?>
+<p:sld xmlns:a="http://schemas.openxmlformats.org/drawingml/2006/main" xmlns:r="http://schemas.openxmlformats.org/officeDocument/2006/relationships" xmlns:p="http://schemas.openxmlformats.org/presentationml/2006/main">
+  <p:cSld>
+    <p:spTree>
+      <p:nvGrpSpPr>
+        <p:cNvPr id="1" name=""/>
+        <p:cNvGrpSpPr/>
+        <p:nvPr/>
+      </p:nvGrpSpPr>
+      <p:grpSpPr>
+        <a:xfrm>
+          <a:off x="0" y="0"/>
+          <a:ext cx="0" cy="0"/>
+          <a:chOff x="0" y="0"/>
+          <a:chExt cx="0" cy="0"/>
+        </a:xfrm>
+      </p:grpSpPr>
+      <p:sp>
+        <p:nvSpPr>
+          <p:cNvPr id="2" name="Title 1"/>
+          <p:cNvSpPr>
+            <a:spLocks noGrp="1"/>
+          </p:cNvSpPr>
+          <p:nvPr>
+            <p:ph type="title"/>
+          </p:nvPr>
+        </p:nvSpPr>
+        <p:spPr/>
+        <p:txBody>
+          <a:bodyPr/>
+          <a:lstStyle/>
+          <a:p>
+            <a:r>
+              <a:rPr lang="en-US" dirty="0"/>
+              <a:t>Question 223.17.6.5</a:t>
+            </a:r>
+          </a:p>
+        </p:txBody>
+      </p:sp>
+      <p:sp>
+        <p:nvSpPr>
+          <p:cNvPr id="3" name="Content Placeholder 2"/>
+          <p:cNvSpPr>
+            <a:spLocks noGrp="1"/>
+          </p:cNvSpPr>
+          <p:nvPr>
+            <p:ph idx="1"/>
+          </p:nvPr>
+        </p:nvSpPr>
+        <p:spPr/>
+        <p:txBody>
+          <a:bodyPr/>
+          <a:lstStyle/>
+          <a:p>
+            <a:pPr>
+              <a:buNone/>
+            </a:pPr>
+            <a:r>
+              <a:rPr lang="en-US" dirty="0"/>
+              <a:t>For a camera, will a larger or a smaller aperture let in more light?</a:t>
+            </a:r>
+          </a:p>
+          <a:p>
+            <a:pPr marL="514350" indent="-514350">
+              <a:buFont typeface="+mj-lt"/>
+              <a:buAutoNum type="alphaLcParenR"/>
+            </a:pPr>
+            <a:r>
+              <a:rPr lang="en-US" dirty="0"/>
+              <a:t>Larger</a:t>
+            </a:r>
+          </a:p>
+          <a:p>
+            <a:pPr marL="514350" indent="-514350">
+              <a:buFont typeface="+mj-lt"/>
+              <a:buAutoNum type="alphaLcParenR"/>
+            </a:pPr>
+            <a:r>
+              <a:rPr lang="en-US" dirty="0"/>
+              <a:t>Smaller</a:t>
+            </a:r>
+          </a:p>
+          <a:p>
+            <a:pPr marL="514350" indent="-514350">
+              <a:buFont typeface="+mj-lt"/>
+              <a:buAutoNum type="alphaLcParenR"/>
+            </a:pPr>
+            <a:r>
+              <a:rPr lang="en-US" dirty="0"/>
+              <a:t>Impossible to tell</a:t>
+            </a:r>
+          </a:p>
+        </p:txBody>
+      </p:sp>
+      <p:sp>
+        <p:nvSpPr>
+          <p:cNvPr id="4" name="Slide Number Placeholder 3"/>
+          <p:cNvSpPr>
+            <a:spLocks noGrp="1"/>
+          </p:cNvSpPr>
+          <p:nvPr>
+            <p:ph type="sldNum" sz="quarter" idx="12"/>
+          </p:nvPr>
+        </p:nvSpPr>
+        <p:spPr/>
+        <p:txBody>
+          <a:bodyPr/>
+          <a:lstStyle/>
+          <a:p>
+            <a:pPr>
+              <a:defRPr/>
+            </a:pPr>
+            <a:fld id="{64137B81-8888-4253-92EC-0AED2A590749}" type="slidenum">
+              <a:rPr lang="en-US" smtClean="0"/>
+              <a:pPr>
+                <a:defRPr/>
+              </a:pPr>
+              <a:t>10</a:t>
+            </a:fld>
+            <a:endParaRPr lang="en-US"/>
+          </a:p>
+        </p:txBody>
+      </p:sp>
+    </p:spTree>
+    <p:extLst>
+      <p:ext uri="{BB962C8B-B14F-4D97-AF65-F5344CB8AC3E}">
+        <p14:creationId xmlns:p14="http://schemas.microsoft.com/office/powerpoint/2010/main" val="3125088823"/>
+      </p:ext>
+    </p:extLst>
+  </p:cSld>
+  <p:clrMapOvr>
+    <a:masterClrMapping/>
+  </p:clrMapOvr>
+</p:sld>
+</file>
+
+<file path=ppt/slides/slide11.xml><?xml version="1.0" encoding="utf-8"?>
+<p:sld xmlns:a="http://schemas.openxmlformats.org/drawingml/2006/main" xmlns:r="http://schemas.openxmlformats.org/officeDocument/2006/relationships" xmlns:p="http://schemas.openxmlformats.org/presentationml/2006/main">
+  <p:cSld>
+    <p:spTree>
+      <p:nvGrpSpPr>
+        <p:cNvPr id="1" name=""/>
+        <p:cNvGrpSpPr/>
+        <p:nvPr/>
+      </p:nvGrpSpPr>
+      <p:grpSpPr>
+        <a:xfrm>
+          <a:off x="0" y="0"/>
+          <a:ext cx="0" cy="0"/>
+          <a:chOff x="0" y="0"/>
+          <a:chExt cx="0" cy="0"/>
+        </a:xfrm>
+      </p:grpSpPr>
+      <p:sp>
+        <p:nvSpPr>
+          <p:cNvPr id="2" name="Title 1"/>
+          <p:cNvSpPr>
+            <a:spLocks noGrp="1"/>
+          </p:cNvSpPr>
+          <p:nvPr>
+            <p:ph type="title"/>
+          </p:nvPr>
+        </p:nvSpPr>
+        <p:spPr/>
+        <p:txBody>
+          <a:bodyPr/>
+          <a:lstStyle/>
+          <a:p>
+            <a:r>
+              <a:rPr lang="en-US" dirty="0"/>
+              <a:t>Question 223.17.7</a:t>
+            </a:r>
+          </a:p>
+        </p:txBody>
+      </p:sp>
+      <p:sp>
+        <p:nvSpPr>
+          <p:cNvPr id="3" name="Content Placeholder 2"/>
+          <p:cNvSpPr>
+            <a:spLocks noGrp="1"/>
+          </p:cNvSpPr>
+          <p:nvPr>
+            <p:ph idx="1"/>
+          </p:nvPr>
+        </p:nvSpPr>
+        <p:spPr/>
+        <p:txBody>
+          <a:bodyPr/>
+          <a:lstStyle/>
+          <a:p>
+            <a:pPr>
+              <a:buNone/>
+            </a:pPr>
+            <a:r>
+              <a:rPr lang="en-US" dirty="0"/>
+              <a:t>What does the f/# tell you?</a:t>
+            </a:r>
+          </a:p>
+          <a:p>
+            <a:pPr marL="514350" indent="-514350">
+              <a:buFont typeface="+mj-lt"/>
+              <a:buAutoNum type="alphaLcParenR"/>
+            </a:pPr>
+            <a:r>
+              <a:rPr lang="en-US" dirty="0"/>
+              <a:t>It gives you a relative intensity measurement</a:t>
+            </a:r>
+          </a:p>
+          <a:p>
+            <a:pPr marL="514350" indent="-514350">
+              <a:buFont typeface="+mj-lt"/>
+              <a:buAutoNum type="alphaLcParenR"/>
+            </a:pPr>
+            <a:r>
+              <a:rPr lang="en-US" dirty="0"/>
+              <a:t>It tells you how large your lens is</a:t>
+            </a:r>
+          </a:p>
+          <a:p>
+            <a:pPr marL="514350" indent="-514350">
+              <a:buFont typeface="+mj-lt"/>
+              <a:buAutoNum type="alphaLcParenR"/>
+            </a:pPr>
+            <a:r>
+              <a:rPr lang="en-US" dirty="0"/>
+              <a:t>It tells you how flat your focal plan array is</a:t>
+            </a:r>
+          </a:p>
+          <a:p>
+            <a:pPr marL="514350" indent="-514350">
+              <a:buFont typeface="+mj-lt"/>
+              <a:buAutoNum type="alphaLcParenR"/>
+            </a:pPr>
+            <a:r>
+              <a:rPr lang="en-US" dirty="0"/>
+              <a:t>Still nothing</a:t>
+            </a:r>
+          </a:p>
+        </p:txBody>
+      </p:sp>
+      <p:sp>
+        <p:nvSpPr>
+          <p:cNvPr id="4" name="Slide Number Placeholder 3"/>
+          <p:cNvSpPr>
+            <a:spLocks noGrp="1"/>
+          </p:cNvSpPr>
+          <p:nvPr>
+            <p:ph type="sldNum" sz="quarter" idx="12"/>
+          </p:nvPr>
+        </p:nvSpPr>
+        <p:spPr/>
+        <p:txBody>
+          <a:bodyPr/>
+          <a:lstStyle/>
+          <a:p>
+            <a:pPr>
+              <a:defRPr/>
+            </a:pPr>
+            <a:fld id="{64137B81-8888-4253-92EC-0AED2A590749}" type="slidenum">
+              <a:rPr lang="en-US" smtClean="0"/>
+              <a:pPr>
+                <a:defRPr/>
+              </a:pPr>
+              <a:t>11</a:t>
+            </a:fld>
+            <a:endParaRPr lang="en-US"/>
+          </a:p>
+        </p:txBody>
+      </p:sp>
+    </p:spTree>
+    <p:extLst>
+      <p:ext uri="{BB962C8B-B14F-4D97-AF65-F5344CB8AC3E}">
+        <p14:creationId xmlns:p14="http://schemas.microsoft.com/office/powerpoint/2010/main" val="1351946503"/>
+      </p:ext>
+    </p:extLst>
+  </p:cSld>
+  <p:clrMapOvr>
+    <a:masterClrMapping/>
+  </p:clrMapOvr>
+</p:sld>
+</file>
+
+<file path=ppt/slides/slide12.xml><?xml version="1.0" encoding="utf-8"?>
+<p:sld xmlns:a="http://schemas.openxmlformats.org/drawingml/2006/main" xmlns:r="http://schemas.openxmlformats.org/officeDocument/2006/relationships" xmlns:p="http://schemas.openxmlformats.org/presentationml/2006/main">
+  <p:cSld>
+    <p:spTree>
+      <p:nvGrpSpPr>
+        <p:cNvPr id="1" name=""/>
+        <p:cNvGrpSpPr/>
+        <p:nvPr/>
+      </p:nvGrpSpPr>
+      <p:grpSpPr>
+        <a:xfrm>
+          <a:off x="0" y="0"/>
+          <a:ext cx="0" cy="0"/>
+          <a:chOff x="0" y="0"/>
+          <a:chExt cx="0" cy="0"/>
+        </a:xfrm>
+      </p:grpSpPr>
+      <p:sp>
+        <p:nvSpPr>
+          <p:cNvPr id="2" name="Rectangle 1"/>
+          <p:cNvSpPr/>
+          <p:nvPr/>
+        </p:nvSpPr>
+        <p:spPr>
+          <a:xfrm>
+            <a:off x="2438400" y="5029200"/>
+            <a:ext cx="4572000" cy="923330"/>
+          </a:xfrm>
+          <a:prstGeom prst="rect">
+            <a:avLst/>
+          </a:prstGeom>
+        </p:spPr>
+        <p:txBody>
+          <a:bodyPr>
+            <a:spAutoFit/>
+          </a:bodyPr>
+          <a:lstStyle/>
+          <a:p>
+            <a:r>
+              <a:rPr lang="en-US" dirty="0"/>
+              <a:t>http://hubblesite.org/the_telescope/hubble_essentials/graphics/telescope_essentials_howworks2_lg.gif</a:t>
+            </a:r>
+          </a:p>
+        </p:txBody>
+      </p:sp>
+      <p:pic>
+        <p:nvPicPr>
+          <p:cNvPr id="3074" name="Picture 2"/>
+          <p:cNvPicPr>
+            <a:picLocks noChangeAspect="1" noChangeArrowheads="1"/>
+          </p:cNvPicPr>
+          <p:nvPr/>
+        </p:nvPicPr>
+        <p:blipFill>
+          <a:blip r:embed="rId2" cstate="print"/>
+          <a:srcRect/>
+          <a:stretch>
+            <a:fillRect/>
+          </a:stretch>
+        </p:blipFill>
+        <p:spPr bwMode="auto">
+          <a:xfrm>
+            <a:off x="1219200" y="762000"/>
+            <a:ext cx="6677025" cy="3867150"/>
+          </a:xfrm>
+          <a:prstGeom prst="rect">
+            <a:avLst/>
+          </a:prstGeom>
+          <a:noFill/>
+          <a:ln w="9525">
+            <a:noFill/>
+            <a:miter lim="800000"/>
+            <a:headEnd/>
+            <a:tailEnd/>
+          </a:ln>
+          <a:effectLst/>
+        </p:spPr>
+      </p:pic>
+    </p:spTree>
+    <p:extLst>
+      <p:ext uri="{BB962C8B-B14F-4D97-AF65-F5344CB8AC3E}">
+        <p14:creationId xmlns:p14="http://schemas.microsoft.com/office/powerpoint/2010/main" val="2432196983"/>
+      </p:ext>
+    </p:extLst>
+  </p:cSld>
+  <p:clrMapOvr>
+    <a:masterClrMapping/>
+  </p:clrMapOvr>
+</p:sld>
+</file>
+
+<file path=ppt/slides/slide13.xml><?xml version="1.0" encoding="utf-8"?>
+<p:sld xmlns:a="http://schemas.openxmlformats.org/drawingml/2006/main" xmlns:r="http://schemas.openxmlformats.org/officeDocument/2006/relationships" xmlns:p="http://schemas.openxmlformats.org/presentationml/2006/main">
+  <p:cSld>
+    <p:spTree>
+      <p:nvGrpSpPr>
+        <p:cNvPr id="1" name=""/>
+        <p:cNvGrpSpPr/>
+        <p:nvPr/>
+      </p:nvGrpSpPr>
+      <p:grpSpPr>
+        <a:xfrm>
+          <a:off x="0" y="0"/>
+          <a:ext cx="0" cy="0"/>
+          <a:chOff x="0" y="0"/>
+          <a:chExt cx="0" cy="0"/>
+        </a:xfrm>
+      </p:grpSpPr>
+      <p:sp>
+        <p:nvSpPr>
+          <p:cNvPr id="3" name="Title 2"/>
+          <p:cNvSpPr>
+            <a:spLocks noGrp="1"/>
+          </p:cNvSpPr>
+          <p:nvPr>
+            <p:ph type="title"/>
+          </p:nvPr>
+        </p:nvSpPr>
+        <p:spPr/>
+        <p:txBody>
+          <a:bodyPr/>
+          <a:lstStyle/>
+          <a:p>
+            <a:r>
+              <a:rPr lang="en-US" dirty="0"/>
+              <a:t>Question 223.18.4</a:t>
+            </a:r>
+          </a:p>
+        </p:txBody>
+      </p:sp>
+      <p:sp>
+        <p:nvSpPr>
+          <p:cNvPr id="4" name="Content Placeholder 3"/>
+          <p:cNvSpPr>
+            <a:spLocks noGrp="1"/>
+          </p:cNvSpPr>
+          <p:nvPr>
+            <p:ph idx="1"/>
+          </p:nvPr>
+        </p:nvSpPr>
+        <p:spPr/>
+        <p:txBody>
+          <a:bodyPr/>
+          <a:lstStyle/>
+          <a:p>
+            <a:pPr>
+              <a:buNone/>
+            </a:pPr>
+            <a:r>
+              <a:rPr lang="en-US" dirty="0"/>
+              <a:t>What is the power (in </a:t>
+            </a:r>
+            <a:r>
+              <a:rPr lang="en-US" dirty="0" err="1"/>
+              <a:t>Diopters</a:t>
+            </a:r>
+            <a:r>
+              <a:rPr lang="en-US" dirty="0"/>
+              <a:t>) of a lens with a focal distance of 0.5m?</a:t>
+            </a:r>
+          </a:p>
+          <a:p>
+            <a:pPr marL="514350" indent="-514350">
+              <a:buFont typeface="+mj-lt"/>
+              <a:buAutoNum type="alphaLcParenR"/>
+            </a:pPr>
+            <a:r>
+              <a:rPr lang="en-US" dirty="0"/>
+              <a:t>5</a:t>
+            </a:r>
+          </a:p>
+          <a:p>
+            <a:pPr marL="514350" indent="-514350">
+              <a:buFont typeface="+mj-lt"/>
+              <a:buAutoNum type="alphaLcParenR"/>
+            </a:pPr>
+            <a:r>
+              <a:rPr lang="en-US" dirty="0"/>
+              <a:t>4</a:t>
+            </a:r>
+          </a:p>
+          <a:p>
+            <a:pPr marL="514350" indent="-514350">
+              <a:buFont typeface="+mj-lt"/>
+              <a:buAutoNum type="alphaLcParenR"/>
+            </a:pPr>
+            <a:r>
+              <a:rPr lang="en-US" dirty="0"/>
+              <a:t>3</a:t>
+            </a:r>
+          </a:p>
+          <a:p>
+            <a:pPr marL="514350" indent="-514350">
+              <a:buFont typeface="+mj-lt"/>
+              <a:buAutoNum type="alphaLcParenR"/>
+            </a:pPr>
+            <a:r>
+              <a:rPr lang="en-US" dirty="0"/>
+              <a:t>2</a:t>
+            </a:r>
+          </a:p>
+          <a:p>
+            <a:pPr marL="514350" indent="-514350">
+              <a:buFont typeface="+mj-lt"/>
+              <a:buAutoNum type="alphaLcParenR"/>
+            </a:pPr>
+            <a:r>
+              <a:rPr lang="en-US" dirty="0"/>
+              <a:t>1</a:t>
+            </a:r>
+          </a:p>
+        </p:txBody>
+      </p:sp>
+      <p:sp>
+        <p:nvSpPr>
+          <p:cNvPr id="2" name="Slide Number Placeholder 1"/>
+          <p:cNvSpPr>
+            <a:spLocks noGrp="1"/>
+          </p:cNvSpPr>
+          <p:nvPr>
+            <p:ph type="sldNum" sz="quarter" idx="12"/>
+          </p:nvPr>
+        </p:nvSpPr>
+        <p:spPr/>
+        <p:txBody>
+          <a:bodyPr/>
+          <a:lstStyle/>
+          <a:p>
+            <a:pPr>
+              <a:defRPr/>
+            </a:pPr>
+            <a:fld id="{7AD10819-D402-4D92-A9F3-11EFF80A1266}" type="slidenum">
+              <a:rPr lang="en-US" smtClean="0"/>
+              <a:pPr>
+                <a:defRPr/>
+              </a:pPr>
+              <a:t>13</a:t>
+            </a:fld>
+            <a:endParaRPr lang="en-US"/>
+          </a:p>
+        </p:txBody>
+      </p:sp>
+    </p:spTree>
+    <p:extLst>
+      <p:ext uri="{BB962C8B-B14F-4D97-AF65-F5344CB8AC3E}">
+        <p14:creationId xmlns:p14="http://schemas.microsoft.com/office/powerpoint/2010/main" val="3949916473"/>
+      </p:ext>
+    </p:extLst>
+  </p:cSld>
+  <p:clrMapOvr>
+    <a:masterClrMapping/>
+  </p:clrMapOvr>
+</p:sld>
+</file>
+
+<file path=ppt/slides/slide14.xml><?xml version="1.0" encoding="utf-8"?>
+<p:sld xmlns:a="http://schemas.openxmlformats.org/drawingml/2006/main" xmlns:r="http://schemas.openxmlformats.org/officeDocument/2006/relationships" xmlns:p="http://schemas.openxmlformats.org/presentationml/2006/main">
+  <p:cSld>
+    <p:spTree>
+      <p:nvGrpSpPr>
+        <p:cNvPr id="1" name=""/>
+        <p:cNvGrpSpPr/>
+        <p:nvPr/>
+      </p:nvGrpSpPr>
+      <p:grpSpPr>
+        <a:xfrm>
+          <a:off x="0" y="0"/>
+          <a:ext cx="0" cy="0"/>
+          <a:chOff x="0" y="0"/>
+          <a:chExt cx="0" cy="0"/>
+        </a:xfrm>
+      </p:grpSpPr>
+      <p:sp>
+        <p:nvSpPr>
+          <p:cNvPr id="9218" name="Footer Placeholder 4"/>
+          <p:cNvSpPr>
+            <a:spLocks noGrp="1"/>
+          </p:cNvSpPr>
+          <p:nvPr>
+            <p:ph type="ftr" sz="quarter" idx="11"/>
+          </p:nvPr>
+        </p:nvSpPr>
+        <p:spPr>
+          <a:noFill/>
+        </p:spPr>
+        <p:txBody>
+          <a:bodyPr/>
+          <a:lstStyle/>
+          <a:p>
+            <a:r>
+              <a:rPr lang="en-US"/>
+              <a:t>R. Todd Lines</a:t>
+            </a:r>
+          </a:p>
+        </p:txBody>
+      </p:sp>
+      <p:sp>
+        <p:nvSpPr>
+          <p:cNvPr id="9219" name="Rectangle 2"/>
+          <p:cNvSpPr>
+            <a:spLocks noGrp="1" noChangeArrowheads="1"/>
+          </p:cNvSpPr>
+          <p:nvPr>
+            <p:ph type="title"/>
+          </p:nvPr>
+        </p:nvSpPr>
+        <p:spPr/>
+        <p:txBody>
+          <a:bodyPr/>
+          <a:lstStyle/>
+          <a:p>
+            <a:pPr eaLnBrk="1" hangingPunct="1"/>
+            <a:r>
+              <a:rPr lang="en-US"/>
+              <a:t>Simple Magnifier</a:t>
+            </a:r>
+          </a:p>
+        </p:txBody>
+      </p:sp>
+      <p:sp>
+        <p:nvSpPr>
+          <p:cNvPr id="9220" name="Rectangle 3"/>
+          <p:cNvSpPr>
+            <a:spLocks noGrp="1" noChangeArrowheads="1"/>
+          </p:cNvSpPr>
+          <p:nvPr>
+            <p:ph type="body" idx="1"/>
+          </p:nvPr>
+        </p:nvSpPr>
+        <p:spPr/>
+        <p:txBody>
+          <a:bodyPr/>
+          <a:lstStyle/>
+          <a:p>
+            <a:pPr eaLnBrk="1" hangingPunct="1"/>
+            <a:r>
+              <a:rPr lang="en-US"/>
+              <a:t>A simple magnifier consists of a single converging lens</a:t>
+            </a:r>
+          </a:p>
+          <a:p>
+            <a:pPr eaLnBrk="1" hangingPunct="1"/>
+            <a:r>
+              <a:rPr lang="en-US"/>
+              <a:t>This device is used to increase the apparent size of an object</a:t>
+            </a:r>
+          </a:p>
+          <a:p>
+            <a:pPr eaLnBrk="1" hangingPunct="1"/>
+            <a:r>
+              <a:rPr lang="en-US"/>
+              <a:t>The size of an image formed on the retina depends on the angle subtended by the eye</a:t>
+            </a:r>
+          </a:p>
+          <a:p>
+            <a:pPr eaLnBrk="1" hangingPunct="1"/>
+            <a:endParaRPr lang="en-US"/>
+          </a:p>
+          <a:p>
+            <a:pPr eaLnBrk="1" hangingPunct="1"/>
+            <a:endParaRPr lang="en-US"/>
+          </a:p>
+        </p:txBody>
+      </p:sp>
+    </p:spTree>
+  </p:cSld>
+  <p:clrMapOvr>
+    <a:masterClrMapping/>
+  </p:clrMapOvr>
+</p:sld>
+</file>
+
+<file path=ppt/slides/slide15.xml><?xml version="1.0" encoding="utf-8"?>
+<p:sld xmlns:a="http://schemas.openxmlformats.org/drawingml/2006/main" xmlns:r="http://schemas.openxmlformats.org/officeDocument/2006/relationships" xmlns:p="http://schemas.openxmlformats.org/presentationml/2006/main">
+  <p:cSld>
+    <p:spTree>
+      <p:nvGrpSpPr>
+        <p:cNvPr id="1" name=""/>
+        <p:cNvGrpSpPr/>
+        <p:nvPr/>
+      </p:nvGrpSpPr>
+      <p:grpSpPr>
+        <a:xfrm>
+          <a:off x="0" y="0"/>
+          <a:ext cx="0" cy="0"/>
+          <a:chOff x="0" y="0"/>
+          <a:chExt cx="0" cy="0"/>
+        </a:xfrm>
+      </p:grpSpPr>
+      <p:pic>
+        <p:nvPicPr>
+          <p:cNvPr id="8194" name="Picture 2"/>
+          <p:cNvPicPr>
+            <a:picLocks noChangeAspect="1" noChangeArrowheads="1"/>
+          </p:cNvPicPr>
+          <p:nvPr/>
+        </p:nvPicPr>
+        <p:blipFill>
+          <a:blip r:embed="rId2">
+            <a:extLst>
+              <a:ext uri="{28A0092B-C50C-407E-A947-70E740481C1C}">
+                <a14:useLocalDpi xmlns:a14="http://schemas.microsoft.com/office/drawing/2010/main" val="0"/>
+              </a:ext>
+            </a:extLst>
+          </a:blip>
+          <a:srcRect/>
+          <a:stretch>
+            <a:fillRect/>
+          </a:stretch>
+        </p:blipFill>
+        <p:spPr bwMode="auto">
+          <a:xfrm>
+            <a:off x="533400" y="2009774"/>
+            <a:ext cx="8294230" cy="2200275"/>
+          </a:xfrm>
+          <a:prstGeom prst="rect">
+            <a:avLst/>
+          </a:prstGeom>
+          <a:noFill/>
+          <a:ln>
+            <a:noFill/>
+          </a:ln>
+          <a:effectLst/>
+          <a:extLst>
+            <a:ext uri="{909E8E84-426E-40DD-AFC4-6F175D3DCCD1}">
+              <a14:hiddenFill xmlns:a14="http://schemas.microsoft.com/office/drawing/2010/main">
+                <a:solidFill>
+                  <a:schemeClr val="accent1"/>
+                </a:solidFill>
+              </a14:hiddenFill>
+            </a:ext>
+            <a:ext uri="{91240B29-F687-4F45-9708-019B960494DF}">
+              <a14:hiddenLine xmlns:a14="http://schemas.microsoft.com/office/drawing/2010/main" w="9525">
+                <a:solidFill>
+                  <a:schemeClr val="tx1"/>
+                </a:solidFill>
+                <a:miter lim="800000"/>
+                <a:headEnd/>
+                <a:tailEnd/>
+              </a14:hiddenLine>
+            </a:ext>
+            <a:ext uri="{AF507438-7753-43E0-B8FC-AC1667EBCBE1}">
+              <a14:hiddenEffects xmlns:a14="http://schemas.microsoft.com/office/drawing/2010/main">
+                <a:effectLst>
+                  <a:outerShdw dist="35921" dir="2700000" algn="ctr" rotWithShape="0">
+                    <a:schemeClr val="bg2"/>
+                  </a:outerShdw>
+                </a:effectLst>
+              </a14:hiddenEffects>
+            </a:ext>
+          </a:extLst>
+        </p:spPr>
+      </p:pic>
+    </p:spTree>
+    <p:extLst>
+      <p:ext uri="{BB962C8B-B14F-4D97-AF65-F5344CB8AC3E}">
+        <p14:creationId xmlns:p14="http://schemas.microsoft.com/office/powerpoint/2010/main" val="784141072"/>
+      </p:ext>
+    </p:extLst>
+  </p:cSld>
+  <p:clrMapOvr>
+    <a:masterClrMapping/>
+  </p:clrMapOvr>
+</p:sld>
+</file>
+
+<file path=ppt/slides/slide16.xml><?xml version="1.0" encoding="utf-8"?>
+<p:sld xmlns:a="http://schemas.openxmlformats.org/drawingml/2006/main" xmlns:r="http://schemas.openxmlformats.org/officeDocument/2006/relationships" xmlns:p="http://schemas.openxmlformats.org/presentationml/2006/main">
+  <p:cSld>
+    <p:spTree>
+      <p:nvGrpSpPr>
+        <p:cNvPr id="1" name=""/>
+        <p:cNvGrpSpPr/>
+        <p:nvPr/>
+      </p:nvGrpSpPr>
+      <p:grpSpPr>
+        <a:xfrm>
+          <a:off x="0" y="0"/>
+          <a:ext cx="0" cy="0"/>
+          <a:chOff x="0" y="0"/>
+          <a:chExt cx="0" cy="0"/>
+        </a:xfrm>
+      </p:grpSpPr>
+      <p:sp>
+        <p:nvSpPr>
+          <p:cNvPr id="2" name="Title 1"/>
+          <p:cNvSpPr>
+            <a:spLocks noGrp="1"/>
+          </p:cNvSpPr>
+          <p:nvPr>
+            <p:ph type="title"/>
+          </p:nvPr>
+        </p:nvSpPr>
+        <p:spPr/>
+        <p:txBody>
+          <a:bodyPr/>
+          <a:lstStyle/>
+          <a:p>
+            <a:endParaRPr lang="en-US"/>
+          </a:p>
+        </p:txBody>
+      </p:sp>
+      <p:sp>
+        <p:nvSpPr>
+          <p:cNvPr id="3" name="Content Placeholder 2"/>
+          <p:cNvSpPr>
+            <a:spLocks noGrp="1"/>
+          </p:cNvSpPr>
+          <p:nvPr>
+            <p:ph idx="1"/>
+          </p:nvPr>
+        </p:nvSpPr>
+        <p:spPr/>
+        <p:txBody>
+          <a:bodyPr/>
+          <a:lstStyle/>
+          <a:p>
+            <a:endParaRPr lang="en-US"/>
+          </a:p>
+        </p:txBody>
+      </p:sp>
+      <p:pic>
+        <p:nvPicPr>
+          <p:cNvPr id="4" name="Picture 3"/>
+          <p:cNvPicPr>
+            <a:picLocks noChangeAspect="1"/>
+          </p:cNvPicPr>
+          <p:nvPr/>
+        </p:nvPicPr>
+        <p:blipFill>
+          <a:blip r:embed="rId2"/>
+          <a:stretch>
+            <a:fillRect/>
+          </a:stretch>
+        </p:blipFill>
+        <p:spPr>
+          <a:xfrm>
+            <a:off x="85725" y="952500"/>
+            <a:ext cx="8972550" cy="4953000"/>
+          </a:xfrm>
+          <a:prstGeom prst="rect">
+            <a:avLst/>
+          </a:prstGeom>
+        </p:spPr>
+      </p:pic>
+    </p:spTree>
+    <p:extLst>
+      <p:ext uri="{BB962C8B-B14F-4D97-AF65-F5344CB8AC3E}">
+        <p14:creationId xmlns:p14="http://schemas.microsoft.com/office/powerpoint/2010/main" val="2905864846"/>
+      </p:ext>
+    </p:extLst>
+  </p:cSld>
+  <p:clrMapOvr>
+    <a:masterClrMapping/>
+  </p:clrMapOvr>
+</p:sld>
+</file>
+
+<file path=ppt/slides/slide17.xml><?xml version="1.0" encoding="utf-8"?>
+<p:sld xmlns:a="http://schemas.openxmlformats.org/drawingml/2006/main" xmlns:r="http://schemas.openxmlformats.org/officeDocument/2006/relationships" xmlns:p="http://schemas.openxmlformats.org/presentationml/2006/main">
+  <p:cSld>
+    <p:spTree>
+      <p:nvGrpSpPr>
+        <p:cNvPr id="1" name=""/>
+        <p:cNvGrpSpPr/>
+        <p:nvPr/>
+      </p:nvGrpSpPr>
+      <p:grpSpPr>
+        <a:xfrm>
+          <a:off x="0" y="0"/>
+          <a:ext cx="0" cy="0"/>
+          <a:chOff x="0" y="0"/>
+          <a:chExt cx="0" cy="0"/>
+        </a:xfrm>
+      </p:grpSpPr>
+      <p:sp>
+        <p:nvSpPr>
+          <p:cNvPr id="10243" name="Rectangle 2"/>
+          <p:cNvSpPr>
+            <a:spLocks noGrp="1" noChangeArrowheads="1"/>
+          </p:cNvSpPr>
+          <p:nvPr>
+            <p:ph type="title"/>
+          </p:nvPr>
+        </p:nvSpPr>
+        <p:spPr/>
+        <p:txBody>
+          <a:bodyPr>
+            <a:normAutofit fontScale="90000"/>
+          </a:bodyPr>
+          <a:lstStyle/>
+          <a:p>
+            <a:pPr eaLnBrk="1" hangingPunct="1"/>
+            <a:r>
+              <a:rPr lang="en-US"/>
+              <a:t>The Size of a Magnified Image</a:t>
+            </a:r>
+          </a:p>
+        </p:txBody>
+      </p:sp>
+      <p:sp>
+        <p:nvSpPr>
+          <p:cNvPr id="10244" name="Rectangle 3"/>
+          <p:cNvSpPr>
+            <a:spLocks noGrp="1" noChangeArrowheads="1"/>
+          </p:cNvSpPr>
+          <p:nvPr>
+            <p:ph type="body" sz="half" idx="1"/>
+          </p:nvPr>
+        </p:nvSpPr>
+        <p:spPr>
+          <a:xfrm>
+            <a:off x="457200" y="1524000"/>
+            <a:ext cx="3810000" cy="4114800"/>
+          </a:xfrm>
+        </p:spPr>
+        <p:txBody>
+          <a:bodyPr/>
+          <a:lstStyle/>
+          <a:p>
+            <a:pPr eaLnBrk="1" hangingPunct="1">
+              <a:lnSpc>
+                <a:spcPct val="90000"/>
+              </a:lnSpc>
+            </a:pPr>
+            <a:r>
+              <a:rPr lang="en-US" sz="2400" dirty="0"/>
+              <a:t>When an object is placed at the near point, the angle subtended is a maximum</a:t>
+            </a:r>
+          </a:p>
+          <a:p>
+            <a:pPr lvl="1" eaLnBrk="1" hangingPunct="1">
+              <a:lnSpc>
+                <a:spcPct val="90000"/>
+              </a:lnSpc>
+            </a:pPr>
+            <a:r>
+              <a:rPr lang="en-US" sz="2000" dirty="0"/>
+              <a:t>The near point is about 25 cm</a:t>
+            </a:r>
+          </a:p>
+          <a:p>
+            <a:pPr eaLnBrk="1" hangingPunct="1">
+              <a:lnSpc>
+                <a:spcPct val="90000"/>
+              </a:lnSpc>
+            </a:pPr>
+            <a:r>
+              <a:rPr lang="en-US" sz="2400" dirty="0"/>
+              <a:t>When the object is placed near the focal point of a converging lens, the lens forms a virtual, upright, and enlarged image</a:t>
+            </a:r>
+          </a:p>
+        </p:txBody>
+      </p:sp>
+      <p:pic>
+        <p:nvPicPr>
+          <p:cNvPr id="7171" name="Picture 3"/>
+          <p:cNvPicPr>
+            <a:picLocks noChangeAspect="1" noChangeArrowheads="1"/>
+          </p:cNvPicPr>
+          <p:nvPr/>
+        </p:nvPicPr>
+        <p:blipFill>
+          <a:blip r:embed="rId2">
+            <a:extLst>
+              <a:ext uri="{28A0092B-C50C-407E-A947-70E740481C1C}">
+                <a14:useLocalDpi xmlns:a14="http://schemas.microsoft.com/office/drawing/2010/main" val="0"/>
+              </a:ext>
+            </a:extLst>
+          </a:blip>
+          <a:srcRect/>
+          <a:stretch>
+            <a:fillRect/>
+          </a:stretch>
+        </p:blipFill>
+        <p:spPr bwMode="auto">
+          <a:xfrm>
+            <a:off x="4700587" y="1683274"/>
+            <a:ext cx="4443413" cy="3967818"/>
+          </a:xfrm>
+          <a:prstGeom prst="rect">
+            <a:avLst/>
+          </a:prstGeom>
+          <a:noFill/>
+          <a:ln>
+            <a:noFill/>
+          </a:ln>
+          <a:effectLst/>
+          <a:extLst>
+            <a:ext uri="{909E8E84-426E-40DD-AFC4-6F175D3DCCD1}">
+              <a14:hiddenFill xmlns:a14="http://schemas.microsoft.com/office/drawing/2010/main">
+                <a:solidFill>
+                  <a:schemeClr val="accent1"/>
+                </a:solidFill>
+              </a14:hiddenFill>
+            </a:ext>
+            <a:ext uri="{91240B29-F687-4F45-9708-019B960494DF}">
+              <a14:hiddenLine xmlns:a14="http://schemas.microsoft.com/office/drawing/2010/main" w="9525">
+                <a:solidFill>
+                  <a:schemeClr val="tx1"/>
+                </a:solidFill>
+                <a:miter lim="800000"/>
+                <a:headEnd/>
+                <a:tailEnd/>
+              </a14:hiddenLine>
+            </a:ext>
+            <a:ext uri="{AF507438-7753-43E0-B8FC-AC1667EBCBE1}">
+              <a14:hiddenEffects xmlns:a14="http://schemas.microsoft.com/office/drawing/2010/main">
+                <a:effectLst>
+                  <a:outerShdw dist="35921" dir="2700000" algn="ctr" rotWithShape="0">
+                    <a:schemeClr val="bg2"/>
+                  </a:outerShdw>
+                </a:effectLst>
+              </a14:hiddenEffects>
+            </a:ext>
+          </a:extLst>
+        </p:spPr>
+      </p:pic>
+    </p:spTree>
+    <p:extLst>
+      <p:ext uri="{BB962C8B-B14F-4D97-AF65-F5344CB8AC3E}">
+        <p14:creationId xmlns:p14="http://schemas.microsoft.com/office/powerpoint/2010/main" val="2007672557"/>
+      </p:ext>
+    </p:extLst>
+  </p:cSld>
+  <p:clrMapOvr>
+    <a:masterClrMapping/>
+  </p:clrMapOvr>
+</p:sld>
+</file>
+
+<file path=ppt/slides/slide18.xml><?xml version="1.0" encoding="utf-8"?>
+<p:sld xmlns:a="http://schemas.openxmlformats.org/drawingml/2006/main" xmlns:r="http://schemas.openxmlformats.org/officeDocument/2006/relationships" xmlns:p="http://schemas.openxmlformats.org/presentationml/2006/main">
+  <p:cSld>
+    <p:spTree>
+      <p:nvGrpSpPr>
+        <p:cNvPr id="1" name=""/>
+        <p:cNvGrpSpPr/>
+        <p:nvPr/>
+      </p:nvGrpSpPr>
+      <p:grpSpPr>
+        <a:xfrm>
+          <a:off x="0" y="0"/>
+          <a:ext cx="0" cy="0"/>
+          <a:chOff x="0" y="0"/>
+          <a:chExt cx="0" cy="0"/>
+        </a:xfrm>
+      </p:grpSpPr>
+      <p:pic>
+        <p:nvPicPr>
+          <p:cNvPr id="5" name="Picture 2"/>
+          <p:cNvPicPr>
+            <a:picLocks noChangeAspect="1" noChangeArrowheads="1"/>
+          </p:cNvPicPr>
+          <p:nvPr/>
+        </p:nvPicPr>
+        <p:blipFill>
+          <a:blip r:embed="rId2">
+            <a:extLst>
+              <a:ext uri="{28A0092B-C50C-407E-A947-70E740481C1C}">
+                <a14:useLocalDpi xmlns:a14="http://schemas.microsoft.com/office/drawing/2010/main" val="0"/>
+              </a:ext>
+            </a:extLst>
+          </a:blip>
+          <a:srcRect/>
+          <a:stretch>
+            <a:fillRect/>
+          </a:stretch>
+        </p:blipFill>
+        <p:spPr bwMode="auto">
+          <a:xfrm>
+            <a:off x="1143000" y="381000"/>
+            <a:ext cx="6576023" cy="5867400"/>
+          </a:xfrm>
+          <a:prstGeom prst="rect">
+            <a:avLst/>
+          </a:prstGeom>
+          <a:noFill/>
+          <a:ln>
+            <a:noFill/>
+          </a:ln>
+          <a:effectLst/>
+          <a:extLst>
+            <a:ext uri="{909E8E84-426E-40DD-AFC4-6F175D3DCCD1}">
+              <a14:hiddenFill xmlns:a14="http://schemas.microsoft.com/office/drawing/2010/main">
+                <a:solidFill>
+                  <a:schemeClr val="accent1"/>
+                </a:solidFill>
+              </a14:hiddenFill>
+            </a:ext>
+            <a:ext uri="{91240B29-F687-4F45-9708-019B960494DF}">
+              <a14:hiddenLine xmlns:a14="http://schemas.microsoft.com/office/drawing/2010/main" w="9525">
+                <a:solidFill>
+                  <a:schemeClr val="tx1"/>
+                </a:solidFill>
+                <a:miter lim="800000"/>
+                <a:headEnd/>
+                <a:tailEnd/>
+              </a14:hiddenLine>
+            </a:ext>
+            <a:ext uri="{AF507438-7753-43E0-B8FC-AC1667EBCBE1}">
+              <a14:hiddenEffects xmlns:a14="http://schemas.microsoft.com/office/drawing/2010/main">
+                <a:effectLst>
+                  <a:outerShdw dist="35921" dir="2700000" algn="ctr" rotWithShape="0">
+                    <a:schemeClr val="bg2"/>
+                  </a:outerShdw>
+                </a:effectLst>
+              </a14:hiddenEffects>
+            </a:ext>
+          </a:extLst>
+        </p:spPr>
+      </p:pic>
+      <p:cxnSp>
+        <p:nvCxnSpPr>
+          <p:cNvPr id="8" name="Straight Connector 7"/>
+          <p:cNvCxnSpPr/>
+          <p:nvPr/>
+        </p:nvCxnSpPr>
+        <p:spPr>
+          <a:xfrm>
+            <a:off x="1727200" y="979054"/>
+            <a:ext cx="0" cy="3094182"/>
+          </a:xfrm>
+          <a:prstGeom prst="line">
+            <a:avLst/>
+          </a:prstGeom>
+          <a:ln>
+            <a:solidFill>
+              <a:schemeClr val="tx1"/>
+            </a:solidFill>
+            <a:prstDash val="dash"/>
+          </a:ln>
+        </p:spPr>
+        <p:style>
+          <a:lnRef idx="1">
+            <a:schemeClr val="accent1"/>
+          </a:lnRef>
+          <a:fillRef idx="0">
+            <a:schemeClr val="accent1"/>
+          </a:fillRef>
+          <a:effectRef idx="0">
+            <a:schemeClr val="accent1"/>
+          </a:effectRef>
+          <a:fontRef idx="minor">
+            <a:schemeClr val="tx1"/>
+          </a:fontRef>
+        </p:style>
+      </p:cxnSp>
+      <p:cxnSp>
+        <p:nvCxnSpPr>
+          <p:cNvPr id="10" name="Straight Connector 9"/>
+          <p:cNvCxnSpPr/>
+          <p:nvPr/>
+        </p:nvCxnSpPr>
+        <p:spPr>
+          <a:xfrm>
+            <a:off x="2941782" y="1011381"/>
+            <a:ext cx="0" cy="3094182"/>
+          </a:xfrm>
+          <a:prstGeom prst="line">
+            <a:avLst/>
+          </a:prstGeom>
+          <a:ln>
+            <a:solidFill>
+              <a:schemeClr val="tx1"/>
+            </a:solidFill>
+            <a:prstDash val="dash"/>
+          </a:ln>
+        </p:spPr>
+        <p:style>
+          <a:lnRef idx="1">
+            <a:schemeClr val="accent1"/>
+          </a:lnRef>
+          <a:fillRef idx="0">
+            <a:schemeClr val="accent1"/>
+          </a:fillRef>
+          <a:effectRef idx="0">
+            <a:schemeClr val="accent1"/>
+          </a:effectRef>
+          <a:fontRef idx="minor">
+            <a:schemeClr val="tx1"/>
+          </a:fontRef>
+        </p:style>
+      </p:cxnSp>
+      <p:cxnSp>
+        <p:nvCxnSpPr>
+          <p:cNvPr id="13" name="Straight Arrow Connector 12"/>
+          <p:cNvCxnSpPr/>
+          <p:nvPr/>
+        </p:nvCxnSpPr>
+        <p:spPr>
+          <a:xfrm>
+            <a:off x="1801090" y="2272145"/>
+            <a:ext cx="1052946" cy="0"/>
+          </a:xfrm>
+          <a:prstGeom prst="straightConnector1">
+            <a:avLst/>
+          </a:prstGeom>
+          <a:ln>
+            <a:solidFill>
+              <a:schemeClr val="tx1"/>
+            </a:solidFill>
+            <a:prstDash val="dash"/>
+            <a:headEnd type="triangle"/>
+            <a:tailEnd type="triangle"/>
+          </a:ln>
+        </p:spPr>
+        <p:style>
+          <a:lnRef idx="1">
+            <a:schemeClr val="accent1"/>
+          </a:lnRef>
+          <a:fillRef idx="0">
+            <a:schemeClr val="accent1"/>
+          </a:fillRef>
+          <a:effectRef idx="0">
+            <a:schemeClr val="accent1"/>
+          </a:effectRef>
+          <a:fontRef idx="minor">
+            <a:schemeClr val="tx1"/>
+          </a:fontRef>
+        </p:style>
+      </p:cxnSp>
+      <p:sp>
+        <p:nvSpPr>
+          <p:cNvPr id="11" name="TextBox 10"/>
+          <p:cNvSpPr txBox="1"/>
+          <p:nvPr/>
+        </p:nvSpPr>
+        <p:spPr>
+          <a:xfrm>
+            <a:off x="2124363" y="2078181"/>
+            <a:ext cx="319318" cy="400110"/>
+          </a:xfrm>
+          <a:prstGeom prst="rect">
+            <a:avLst/>
+          </a:prstGeom>
+          <a:solidFill>
+            <a:schemeClr val="bg1"/>
+          </a:solidFill>
+        </p:spPr>
+        <p:txBody>
+          <a:bodyPr wrap="none" rtlCol="0">
+            <a:spAutoFit/>
+          </a:bodyPr>
+          <a:lstStyle/>
+          <a:p>
+            <a:r>
+              <a:rPr lang="en-US" sz="2000" dirty="0"/>
+              <a:t>d</a:t>
+            </a:r>
+          </a:p>
+        </p:txBody>
+      </p:sp>
+    </p:spTree>
+    <p:extLst>
+      <p:ext uri="{BB962C8B-B14F-4D97-AF65-F5344CB8AC3E}">
+        <p14:creationId xmlns:p14="http://schemas.microsoft.com/office/powerpoint/2010/main" val="873789064"/>
+      </p:ext>
+    </p:extLst>
+  </p:cSld>
+  <p:clrMapOvr>
+    <a:masterClrMapping/>
+  </p:clrMapOvr>
+</p:sld>
+</file>
+
+<file path=ppt/slides/slide19.xml><?xml version="1.0" encoding="utf-8"?>
+<p:sld xmlns:a="http://schemas.openxmlformats.org/drawingml/2006/main" xmlns:r="http://schemas.openxmlformats.org/officeDocument/2006/relationships" xmlns:p="http://schemas.openxmlformats.org/presentationml/2006/main">
+  <p:cSld>
+    <p:spTree>
+      <p:nvGrpSpPr>
+        <p:cNvPr id="1" name=""/>
+        <p:cNvGrpSpPr/>
+        <p:nvPr/>
+      </p:nvGrpSpPr>
+      <p:grpSpPr>
+        <a:xfrm>
+          <a:off x="0" y="0"/>
+          <a:ext cx="0" cy="0"/>
+          <a:chOff x="0" y="0"/>
+          <a:chExt cx="0" cy="0"/>
+        </a:xfrm>
+      </p:grpSpPr>
+      <p:sp>
+        <p:nvSpPr>
+          <p:cNvPr id="1028" name="Footer Placeholder 4"/>
+          <p:cNvSpPr>
+            <a:spLocks noGrp="1"/>
+          </p:cNvSpPr>
+          <p:nvPr>
+            <p:ph type="ftr" sz="quarter" idx="11"/>
+          </p:nvPr>
+        </p:nvSpPr>
+        <p:spPr>
+          <a:noFill/>
+        </p:spPr>
+        <p:txBody>
+          <a:bodyPr/>
+          <a:lstStyle/>
+          <a:p>
+            <a:r>
+              <a:rPr lang="en-US"/>
+              <a:t>R. Todd Lines</a:t>
+            </a:r>
+          </a:p>
+        </p:txBody>
+      </p:sp>
+      <p:sp>
+        <p:nvSpPr>
+          <p:cNvPr id="1029" name="Rectangle 2"/>
+          <p:cNvSpPr>
+            <a:spLocks noGrp="1" noChangeArrowheads="1"/>
+          </p:cNvSpPr>
+          <p:nvPr>
+            <p:ph type="title"/>
+          </p:nvPr>
+        </p:nvSpPr>
+        <p:spPr/>
+        <p:txBody>
+          <a:bodyPr/>
+          <a:lstStyle/>
+          <a:p>
+            <a:pPr eaLnBrk="1" hangingPunct="1"/>
+            <a:r>
+              <a:rPr lang="en-US"/>
+              <a:t>Angular Magnification</a:t>
+            </a:r>
+          </a:p>
+        </p:txBody>
+      </p:sp>
+      <p:sp>
+        <p:nvSpPr>
+          <p:cNvPr id="1030" name="Rectangle 3"/>
+          <p:cNvSpPr>
+            <a:spLocks noGrp="1" noChangeArrowheads="1"/>
+          </p:cNvSpPr>
+          <p:nvPr>
+            <p:ph type="body" idx="1"/>
+          </p:nvPr>
+        </p:nvSpPr>
+        <p:spPr/>
+        <p:txBody>
+          <a:bodyPr/>
+          <a:lstStyle/>
+          <a:p>
+            <a:pPr eaLnBrk="1" hangingPunct="1">
+              <a:lnSpc>
+                <a:spcPct val="90000"/>
+              </a:lnSpc>
+            </a:pPr>
+            <a:r>
+              <a:rPr lang="en-US" b="1" dirty="0"/>
+              <a:t>Angular magnification</a:t>
+            </a:r>
+            <a:r>
+              <a:rPr lang="en-US" dirty="0"/>
+              <a:t> is defined as</a:t>
+            </a:r>
+          </a:p>
+          <a:p>
+            <a:pPr eaLnBrk="1" hangingPunct="1">
+              <a:lnSpc>
+                <a:spcPct val="90000"/>
+              </a:lnSpc>
+            </a:pPr>
+            <a:endParaRPr lang="en-US" dirty="0"/>
+          </a:p>
+          <a:p>
+            <a:pPr eaLnBrk="1" hangingPunct="1">
+              <a:lnSpc>
+                <a:spcPct val="90000"/>
+              </a:lnSpc>
+            </a:pPr>
+            <a:endParaRPr lang="en-US" dirty="0"/>
+          </a:p>
+          <a:p>
+            <a:pPr eaLnBrk="1" hangingPunct="1">
+              <a:lnSpc>
+                <a:spcPct val="90000"/>
+              </a:lnSpc>
+            </a:pPr>
+            <a:r>
+              <a:rPr lang="en-US" dirty="0"/>
+              <a:t>The angular magnification is at a maximum when the image formed by the lens is at the near point of the eye</a:t>
+            </a:r>
+          </a:p>
+          <a:p>
+            <a:pPr lvl="1" eaLnBrk="1" hangingPunct="1">
+              <a:lnSpc>
+                <a:spcPct val="90000"/>
+              </a:lnSpc>
+            </a:pPr>
+            <a:r>
+              <a:rPr lang="en-US" i="1" dirty="0"/>
+              <a:t>s’</a:t>
+            </a:r>
+            <a:r>
+              <a:rPr lang="en-US" dirty="0"/>
+              <a:t> = - 25 cm</a:t>
+            </a:r>
+          </a:p>
+          <a:p>
+            <a:pPr lvl="1" eaLnBrk="1" hangingPunct="1">
+              <a:lnSpc>
+                <a:spcPct val="90000"/>
+              </a:lnSpc>
+            </a:pPr>
+            <a:r>
+              <a:rPr lang="en-US" dirty="0"/>
+              <a:t>Calculated by </a:t>
+            </a:r>
+          </a:p>
+        </p:txBody>
+      </p:sp>
+      <p:graphicFrame>
+        <p:nvGraphicFramePr>
+          <p:cNvPr id="1026" name="Object 4"/>
+          <p:cNvGraphicFramePr>
+            <a:graphicFrameLocks noChangeAspect="1"/>
+          </p:cNvGraphicFramePr>
+          <p:nvPr/>
+        </p:nvGraphicFramePr>
+        <p:xfrm>
+          <a:off x="2655888" y="2159000"/>
+          <a:ext cx="3835400" cy="881063"/>
+        </p:xfrm>
+        <a:graphic>
+          <a:graphicData uri="http://schemas.openxmlformats.org/presentationml/2006/ole">
+            <mc:AlternateContent xmlns:mc="http://schemas.openxmlformats.org/markup-compatibility/2006">
+              <mc:Choice xmlns:v="urn:schemas-microsoft-com:vml" Requires="v">
+                <p:oleObj name="Equation" r:id="rId2" imgW="1879560" imgH="431640" progId="">
+                  <p:embed/>
+                </p:oleObj>
+              </mc:Choice>
+              <mc:Fallback>
+                <p:oleObj name="Equation" r:id="rId2" imgW="1879560" imgH="431640" progId="">
+                  <p:embed/>
+                  <p:pic>
+                    <p:nvPicPr>
+                      <p:cNvPr id="1026" name="Object 4"/>
+                      <p:cNvPicPr>
+                        <a:picLocks noChangeAspect="1" noChangeArrowheads="1"/>
+                      </p:cNvPicPr>
+                      <p:nvPr/>
+                    </p:nvPicPr>
+                    <p:blipFill>
+                      <a:blip r:embed="rId3">
+                        <a:extLst>
+                          <a:ext uri="{28A0092B-C50C-407E-A947-70E740481C1C}">
+                            <a14:useLocalDpi xmlns:a14="http://schemas.microsoft.com/office/drawing/2010/main" val="0"/>
+                          </a:ext>
+                        </a:extLst>
+                      </a:blip>
+                      <a:srcRect/>
+                      <a:stretch>
+                        <a:fillRect/>
+                      </a:stretch>
+                    </p:blipFill>
+                    <p:spPr bwMode="auto">
+                      <a:xfrm>
+                        <a:off x="2655888" y="2159000"/>
+                        <a:ext cx="3835400" cy="881063"/>
+                      </a:xfrm>
+                      <a:prstGeom prst="rect">
+                        <a:avLst/>
+                      </a:prstGeom>
+                      <a:noFill/>
+                      <a:extLst>
+                        <a:ext uri="{909E8E84-426E-40DD-AFC4-6F175D3DCCD1}">
+                          <a14:hiddenFill xmlns:a14="http://schemas.microsoft.com/office/drawing/2010/main">
+                            <a:solidFill>
+                              <a:srgbClr val="FFFFFF"/>
+                            </a:solidFill>
+                          </a14:hiddenFill>
+                        </a:ext>
+                      </a:extLst>
+                    </p:spPr>
+                  </p:pic>
+                </p:oleObj>
+              </mc:Fallback>
+            </mc:AlternateContent>
+          </a:graphicData>
+        </a:graphic>
+      </p:graphicFrame>
+      <p:graphicFrame>
+        <p:nvGraphicFramePr>
+          <p:cNvPr id="1027" name="Object 5"/>
+          <p:cNvGraphicFramePr>
+            <a:graphicFrameLocks noChangeAspect="1"/>
+          </p:cNvGraphicFramePr>
+          <p:nvPr/>
+        </p:nvGraphicFramePr>
+        <p:xfrm>
+          <a:off x="4354513" y="5014913"/>
+          <a:ext cx="2470150" cy="868362"/>
+        </p:xfrm>
+        <a:graphic>
+          <a:graphicData uri="http://schemas.openxmlformats.org/presentationml/2006/ole">
+            <mc:AlternateContent xmlns:mc="http://schemas.openxmlformats.org/markup-compatibility/2006">
+              <mc:Choice xmlns:v="urn:schemas-microsoft-com:vml" Requires="v">
+                <p:oleObj name="Equation" r:id="rId4" imgW="1193760" imgH="419040" progId="">
+                  <p:embed/>
+                </p:oleObj>
+              </mc:Choice>
+              <mc:Fallback>
+                <p:oleObj name="Equation" r:id="rId4" imgW="1193760" imgH="419040" progId="">
+                  <p:embed/>
+                  <p:pic>
+                    <p:nvPicPr>
+                      <p:cNvPr id="1027" name="Object 5"/>
+                      <p:cNvPicPr>
+                        <a:picLocks noChangeAspect="1" noChangeArrowheads="1"/>
+                      </p:cNvPicPr>
+                      <p:nvPr/>
+                    </p:nvPicPr>
+                    <p:blipFill>
+                      <a:blip r:embed="rId5">
+                        <a:extLst>
+                          <a:ext uri="{28A0092B-C50C-407E-A947-70E740481C1C}">
+                            <a14:useLocalDpi xmlns:a14="http://schemas.microsoft.com/office/drawing/2010/main" val="0"/>
+                          </a:ext>
+                        </a:extLst>
+                      </a:blip>
+                      <a:srcRect/>
+                      <a:stretch>
+                        <a:fillRect/>
+                      </a:stretch>
+                    </p:blipFill>
+                    <p:spPr bwMode="auto">
+                      <a:xfrm>
+                        <a:off x="4354513" y="5014913"/>
+                        <a:ext cx="2470150" cy="868362"/>
+                      </a:xfrm>
+                      <a:prstGeom prst="rect">
+                        <a:avLst/>
+                      </a:prstGeom>
+                      <a:noFill/>
+                      <a:extLst>
+                        <a:ext uri="{909E8E84-426E-40DD-AFC4-6F175D3DCCD1}">
+                          <a14:hiddenFill xmlns:a14="http://schemas.microsoft.com/office/drawing/2010/main">
+                            <a:solidFill>
+                              <a:srgbClr val="FFFFFF"/>
+                            </a:solidFill>
+                          </a14:hiddenFill>
+                        </a:ext>
+                      </a:extLst>
+                    </p:spPr>
+                  </p:pic>
+                </p:oleObj>
+              </mc:Fallback>
+            </mc:AlternateContent>
+          </a:graphicData>
+        </a:graphic>
+      </p:graphicFrame>
+    </p:spTree>
+  </p:cSld>
+  <p:clrMapOvr>
+    <a:masterClrMapping/>
+  </p:clrMapOvr>
+</p:sld>
+</file>
+
+<file path=ppt/slides/slide2.xml><?xml version="1.0" encoding="utf-8"?>
+<p:sld xmlns:a="http://schemas.openxmlformats.org/drawingml/2006/main" xmlns:r="http://schemas.openxmlformats.org/officeDocument/2006/relationships" xmlns:p="http://schemas.openxmlformats.org/presentationml/2006/main">
+  <p:cSld>
+    <p:spTree>
+      <p:nvGrpSpPr>
+        <p:cNvPr id="1" name=""/>
+        <p:cNvGrpSpPr/>
+        <p:nvPr/>
+      </p:nvGrpSpPr>
+      <p:grpSpPr>
+        <a:xfrm>
+          <a:off x="0" y="0"/>
+          <a:ext cx="0" cy="0"/>
+          <a:chOff x="0" y="0"/>
+          <a:chExt cx="0" cy="0"/>
+        </a:xfrm>
+      </p:grpSpPr>
+      <p:sp>
+        <p:nvSpPr>
           <p:cNvPr id="180227" name="Rectangle 2"/>
           <p:cNvSpPr>
             <a:spLocks noGrp="1" noChangeArrowheads="1"/>
@@ -3981,7 +5718,7 @@
           <a:p>
             <a:pPr eaLnBrk="1" hangingPunct="1"/>
             <a:r>
-              <a:rPr lang="en-US" dirty="0" smtClean="0"/>
+              <a:rPr lang="en-US" dirty="0"/>
               <a:t>Question 223.17.3</a:t>
             </a:r>
           </a:p>
@@ -4009,7 +5746,7 @@
               <a:buNone/>
             </a:pPr>
             <a:r>
-              <a:rPr lang="en-US" dirty="0" smtClean="0"/>
+              <a:rPr lang="en-US" dirty="0"/>
               <a:t>I have two lenses placed with a separation of 1m  to form an optical system. The focal length of the combined system is…..</a:t>
             </a:r>
           </a:p>
@@ -4019,7 +5756,7 @@
               <a:buAutoNum type="alphaLcParenR"/>
             </a:pPr>
             <a:r>
-              <a:rPr lang="en-US" dirty="0" smtClean="0"/>
+              <a:rPr lang="en-US" dirty="0"/>
               <a:t> </a:t>
             </a:r>
           </a:p>
@@ -4029,7 +5766,7 @@
               <a:buAutoNum type="alphaLcParenR"/>
             </a:pPr>
             <a:r>
-              <a:rPr lang="en-US" dirty="0" smtClean="0"/>
+              <a:rPr lang="en-US" dirty="0"/>
               <a:t>25cm</a:t>
             </a:r>
           </a:p>
@@ -4039,26 +5776,26 @@
               <a:buAutoNum type="alphaLcParenR"/>
             </a:pPr>
             <a:r>
-              <a:rPr lang="en-US" dirty="0" smtClean="0"/>
+              <a:rPr lang="en-US" dirty="0"/>
               <a:t>f</a:t>
             </a:r>
             <a:r>
-              <a:rPr lang="en-US" baseline="-25000" dirty="0" smtClean="0"/>
+              <a:rPr lang="en-US" baseline="-25000" dirty="0"/>
               <a:t>1</a:t>
             </a:r>
             <a:r>
-              <a:rPr lang="en-US" dirty="0" smtClean="0"/>
+              <a:rPr lang="en-US" dirty="0"/>
               <a:t> + f</a:t>
             </a:r>
             <a:r>
-              <a:rPr lang="en-US" baseline="-25000" dirty="0" smtClean="0"/>
+              <a:rPr lang="en-US" baseline="-25000" dirty="0"/>
               <a:t>2</a:t>
             </a:r>
             <a:r>
-              <a:rPr lang="en-US" dirty="0" smtClean="0"/>
+              <a:rPr lang="en-US" dirty="0"/>
               <a:t> </a:t>
             </a:r>
-            <a:endParaRPr lang="en-US" baseline="-25000" dirty="0" smtClean="0"/>
+            <a:endParaRPr lang="en-US" baseline="-25000" dirty="0"/>
           </a:p>
           <a:p>
             <a:pPr marL="609600" indent="-609600">
@@ -4066,19 +5803,19 @@
               <a:buAutoNum type="alphaLcParenR"/>
             </a:pPr>
             <a:r>
-              <a:rPr lang="en-US" dirty="0" smtClean="0"/>
+              <a:rPr lang="en-US" dirty="0"/>
               <a:t>f</a:t>
             </a:r>
             <a:r>
-              <a:rPr lang="en-US" baseline="-25000" dirty="0" smtClean="0"/>
+              <a:rPr lang="en-US" baseline="-25000" dirty="0"/>
               <a:t>1</a:t>
             </a:r>
             <a:r>
-              <a:rPr lang="en-US" dirty="0" smtClean="0"/>
+              <a:rPr lang="en-US" dirty="0"/>
               <a:t> x f</a:t>
             </a:r>
             <a:r>
-              <a:rPr lang="en-US" baseline="-25000" dirty="0" smtClean="0"/>
+              <a:rPr lang="en-US" baseline="-25000" dirty="0"/>
               <a:t>2</a:t>
             </a:r>
           </a:p>
@@ -4088,7 +5825,7 @@
               <a:buAutoNum type="alphaLcParenR"/>
             </a:pPr>
             <a:r>
-              <a:rPr lang="en-US" dirty="0" smtClean="0"/>
+              <a:rPr lang="en-US" dirty="0"/>
               <a:t>No simple relationship</a:t>
             </a:r>
           </a:p>
@@ -4114,9 +5851,9 @@
             <a:fld id="{0301146B-F335-4073-85A8-072265A7A279}" type="slidenum">
               <a:rPr lang="en-US" smtClean="0"/>
               <a:pPr/>
-              <a:t>1</a:t>
+              <a:t>2</a:t>
             </a:fld>
-            <a:endParaRPr lang="en-US" smtClean="0"/>
+            <a:endParaRPr lang="en-US"/>
           </a:p>
         </p:txBody>
       </p:sp>
@@ -4174,12 +5911,12 @@
           <a:graphicData uri="http://schemas.openxmlformats.org/presentationml/2006/ole">
             <mc:AlternateContent xmlns:mc="http://schemas.openxmlformats.org/markup-compatibility/2006">
               <mc:Choice xmlns:v="urn:schemas-microsoft-com:vml" Requires="v">
-                <p:oleObj spid="_x0000_s1028" name="Equation" r:id="rId3" imgW="787400" imgH="431800" progId="Equation.3">
+                <p:oleObj name="Equation" r:id="rId2" imgW="787400" imgH="431800" progId="Equation.3">
                   <p:embed/>
                 </p:oleObj>
               </mc:Choice>
               <mc:Fallback>
-                <p:oleObj name="Equation" r:id="rId3" imgW="787400" imgH="431800" progId="Equation.3">
+                <p:oleObj name="Equation" r:id="rId2" imgW="787400" imgH="431800" progId="Equation.3">
                   <p:embed/>
                   <p:pic>
                     <p:nvPicPr>
@@ -4190,7 +5927,7 @@
                       <p:nvPr/>
                     </p:nvPicPr>
                     <p:blipFill>
-                      <a:blip r:embed="rId4">
+                      <a:blip r:embed="rId3">
                         <a:extLst>
                           <a:ext uri="{28A0092B-C50C-407E-A947-70E740481C1C}">
                             <a14:useLocalDpi xmlns:a14="http://schemas.microsoft.com/office/drawing/2010/main" val="0"/>
@@ -4238,17 +5975,10 @@
   <p:clrMapOvr>
     <a:masterClrMapping/>
   </p:clrMapOvr>
-  <p:timing>
-    <p:tnLst>
-      <p:par>
-        <p:cTn id="1" dur="indefinite" restart="never" nodeType="tmRoot"/>
-      </p:par>
-    </p:tnLst>
-  </p:timing>
 </p:sld>
 </file>
 
-<file path=ppt/slides/slide10.xml><?xml version="1.0" encoding="utf-8"?>
+<file path=ppt/slides/slide20.xml><?xml version="1.0" encoding="utf-8"?>
 <p:sld xmlns:a="http://schemas.openxmlformats.org/drawingml/2006/main" xmlns:r="http://schemas.openxmlformats.org/officeDocument/2006/relationships" xmlns:p="http://schemas.openxmlformats.org/presentationml/2006/main">
   <p:cSld>
     <p:spTree>
@@ -4267,11 +5997,35 @@
       </p:grpSpPr>
       <p:sp>
         <p:nvSpPr>
-          <p:cNvPr id="2" name="Title 1"/>
+          <p:cNvPr id="2051" name="Footer Placeholder 4"/>
           <p:cNvSpPr>
             <a:spLocks noGrp="1"/>
           </p:cNvSpPr>
           <p:nvPr>
+            <p:ph type="ftr" sz="quarter" idx="11"/>
+          </p:nvPr>
+        </p:nvSpPr>
+        <p:spPr>
+          <a:noFill/>
+        </p:spPr>
+        <p:txBody>
+          <a:bodyPr/>
+          <a:lstStyle/>
+          <a:p>
+            <a:r>
+              <a:rPr lang="en-US"/>
+              <a:t>R. Todd Lines</a:t>
+            </a:r>
+          </a:p>
+        </p:txBody>
+      </p:sp>
+      <p:sp>
+        <p:nvSpPr>
+          <p:cNvPr id="2052" name="Rectangle 2"/>
+          <p:cNvSpPr>
+            <a:spLocks noGrp="1" noChangeArrowheads="1"/>
+          </p:cNvSpPr>
+          <p:nvPr>
             <p:ph type="title"/>
           </p:nvPr>
         </p:nvSpPr>
@@ -4280,22 +6034,22 @@
           <a:bodyPr/>
           <a:lstStyle/>
           <a:p>
-            <a:r>
-              <a:rPr lang="en-US" dirty="0" smtClean="0"/>
-              <a:t>Question 223.17.7</a:t>
-            </a:r>
-            <a:endParaRPr lang="en-US" dirty="0"/>
-          </a:p>
-        </p:txBody>
-      </p:sp>
-      <p:sp>
-        <p:nvSpPr>
-          <p:cNvPr id="3" name="Content Placeholder 2"/>
+            <a:pPr eaLnBrk="1" hangingPunct="1"/>
+            <a:r>
+              <a:rPr lang="en-US"/>
+              <a:t>Angular Magnification, cont.</a:t>
+            </a:r>
+          </a:p>
+        </p:txBody>
+      </p:sp>
+      <p:sp>
+        <p:nvSpPr>
+          <p:cNvPr id="2053" name="Rectangle 3"/>
           <p:cNvSpPr>
-            <a:spLocks noGrp="1"/>
+            <a:spLocks noGrp="1" noChangeArrowheads="1"/>
           </p:cNvSpPr>
           <p:nvPr>
-            <p:ph idx="1"/>
+            <p:ph type="body" idx="1"/>
           </p:nvPr>
         </p:nvSpPr>
         <p:spPr/>
@@ -4303,92 +6057,106 @@
           <a:bodyPr/>
           <a:lstStyle/>
           <a:p>
-            <a:pPr>
-              <a:buNone/>
-            </a:pPr>
-            <a:r>
-              <a:rPr lang="en-US" dirty="0" smtClean="0"/>
-              <a:t>What does the f/# tell you?</a:t>
-            </a:r>
-          </a:p>
-          <a:p>
-            <a:pPr marL="514350" indent="-514350">
-              <a:buFont typeface="+mj-lt"/>
-              <a:buAutoNum type="alphaLcParenR"/>
-            </a:pPr>
-            <a:r>
-              <a:rPr lang="en-US" dirty="0" smtClean="0"/>
-              <a:t>It gives you a relative intensity measurement</a:t>
-            </a:r>
-          </a:p>
-          <a:p>
-            <a:pPr marL="514350" indent="-514350">
-              <a:buFont typeface="+mj-lt"/>
-              <a:buAutoNum type="alphaLcParenR"/>
-            </a:pPr>
-            <a:r>
-              <a:rPr lang="en-US" dirty="0" smtClean="0"/>
-              <a:t>It tells you how large your lens is</a:t>
-            </a:r>
-          </a:p>
-          <a:p>
-            <a:pPr marL="514350" indent="-514350">
-              <a:buFont typeface="+mj-lt"/>
-              <a:buAutoNum type="alphaLcParenR"/>
-            </a:pPr>
-            <a:r>
-              <a:rPr lang="en-US" dirty="0" smtClean="0"/>
-              <a:t>It tells you how flat your focal plan array is</a:t>
-            </a:r>
-          </a:p>
-          <a:p>
-            <a:pPr marL="514350" indent="-514350">
-              <a:buFont typeface="+mj-lt"/>
-              <a:buAutoNum type="alphaLcParenR"/>
-            </a:pPr>
-            <a:r>
-              <a:rPr lang="en-US" dirty="0" smtClean="0"/>
-              <a:t>Still nothing</a:t>
-            </a:r>
-            <a:endParaRPr lang="en-US" dirty="0"/>
-          </a:p>
-        </p:txBody>
-      </p:sp>
-      <p:sp>
-        <p:nvSpPr>
-          <p:cNvPr id="4" name="Slide Number Placeholder 3"/>
-          <p:cNvSpPr>
-            <a:spLocks noGrp="1"/>
-          </p:cNvSpPr>
-          <p:nvPr>
-            <p:ph type="sldNum" sz="quarter" idx="12"/>
-          </p:nvPr>
-        </p:nvSpPr>
-        <p:spPr/>
-        <p:txBody>
-          <a:bodyPr/>
-          <a:lstStyle/>
-          <a:p>
-            <a:pPr>
-              <a:defRPr/>
-            </a:pPr>
-            <a:fld id="{64137B81-8888-4253-92EC-0AED2A590749}" type="slidenum">
-              <a:rPr lang="en-US" smtClean="0"/>
-              <a:pPr>
-                <a:defRPr/>
-              </a:pPr>
-              <a:t>10</a:t>
-            </a:fld>
-            <a:endParaRPr lang="en-US"/>
-          </a:p>
-        </p:txBody>
-      </p:sp>
+            <a:pPr eaLnBrk="1" hangingPunct="1"/>
+            <a:r>
+              <a:rPr lang="en-US" sz="2800"/>
+              <a:t>The eye is most relaxed when the image is at infinity</a:t>
+            </a:r>
+          </a:p>
+          <a:p>
+            <a:pPr lvl="1" eaLnBrk="1" hangingPunct="1"/>
+            <a:r>
+              <a:rPr lang="en-US" sz="2400"/>
+              <a:t>Although the eye can focus on an object anywhere between the near point and infinity</a:t>
+            </a:r>
+          </a:p>
+          <a:p>
+            <a:pPr eaLnBrk="1" hangingPunct="1"/>
+            <a:r>
+              <a:rPr lang="en-US" sz="2800"/>
+              <a:t>For the image formed by a magnifying glass to appear at infinity, the object has to be at the focal point of the lens</a:t>
+            </a:r>
+          </a:p>
+          <a:p>
+            <a:pPr eaLnBrk="1" hangingPunct="1"/>
+            <a:r>
+              <a:rPr lang="en-US" sz="2800"/>
+              <a:t>The angular magnification is </a:t>
+            </a:r>
+          </a:p>
+        </p:txBody>
+      </p:sp>
+      <p:graphicFrame>
+        <p:nvGraphicFramePr>
+          <p:cNvPr id="2050" name="Object 4"/>
+          <p:cNvGraphicFramePr>
+            <a:graphicFrameLocks noChangeAspect="1"/>
+          </p:cNvGraphicFramePr>
+          <p:nvPr/>
+        </p:nvGraphicFramePr>
+        <p:xfrm>
+          <a:off x="5997575" y="4808538"/>
+          <a:ext cx="2781300" cy="974725"/>
+        </p:xfrm>
+        <a:graphic>
+          <a:graphicData uri="http://schemas.openxmlformats.org/presentationml/2006/ole">
+            <mc:AlternateContent xmlns:mc="http://schemas.openxmlformats.org/markup-compatibility/2006">
+              <mc:Choice xmlns:v="urn:schemas-microsoft-com:vml" Requires="v">
+                <p:oleObj name="Equation" r:id="rId2" imgW="1231560" imgH="431640" progId="">
+                  <p:embed/>
+                </p:oleObj>
+              </mc:Choice>
+              <mc:Fallback>
+                <p:oleObj name="Equation" r:id="rId2" imgW="1231560" imgH="431640" progId="">
+                  <p:embed/>
+                  <p:pic>
+                    <p:nvPicPr>
+                      <p:cNvPr id="2050" name="Object 4"/>
+                      <p:cNvPicPr>
+                        <a:picLocks noChangeAspect="1" noChangeArrowheads="1"/>
+                      </p:cNvPicPr>
+                      <p:nvPr/>
+                    </p:nvPicPr>
+                    <p:blipFill>
+                      <a:blip r:embed="rId3">
+                        <a:extLst>
+                          <a:ext uri="{28A0092B-C50C-407E-A947-70E740481C1C}">
+                            <a14:useLocalDpi xmlns:a14="http://schemas.microsoft.com/office/drawing/2010/main" val="0"/>
+                          </a:ext>
+                        </a:extLst>
+                      </a:blip>
+                      <a:srcRect/>
+                      <a:stretch>
+                        <a:fillRect/>
+                      </a:stretch>
+                    </p:blipFill>
+                    <p:spPr bwMode="auto">
+                      <a:xfrm>
+                        <a:off x="5997575" y="4808538"/>
+                        <a:ext cx="2781300" cy="974725"/>
+                      </a:xfrm>
+                      <a:prstGeom prst="rect">
+                        <a:avLst/>
+                      </a:prstGeom>
+                      <a:noFill/>
+                      <a:extLst>
+                        <a:ext uri="{909E8E84-426E-40DD-AFC4-6F175D3DCCD1}">
+                          <a14:hiddenFill xmlns:a14="http://schemas.microsoft.com/office/drawing/2010/main">
+                            <a:solidFill>
+                              <a:srgbClr val="FFFFFF"/>
+                            </a:solidFill>
+                          </a14:hiddenFill>
+                        </a:ext>
+                      </a:extLst>
+                    </p:spPr>
+                  </p:pic>
+                </p:oleObj>
+              </mc:Fallback>
+            </mc:AlternateContent>
+          </a:graphicData>
+        </a:graphic>
+      </p:graphicFrame>
     </p:spTree>
-    <p:extLst>
-      <p:ext uri="{BB962C8B-B14F-4D97-AF65-F5344CB8AC3E}">
-        <p14:creationId xmlns:p14="http://schemas.microsoft.com/office/powerpoint/2010/main" val="1351946503"/>
-      </p:ext>
-    </p:extLst>
   </p:cSld>
   <p:clrMapOvr>
     <a:masterClrMapping/>
@@ -4396,7 +6164,7 @@
 </p:sld>
 </file>
 
-<file path=ppt/slides/slide11.xml><?xml version="1.0" encoding="utf-8"?>
+<file path=ppt/slides/slide21.xml><?xml version="1.0" encoding="utf-8"?>
 <p:sld xmlns:a="http://schemas.openxmlformats.org/drawingml/2006/main" xmlns:r="http://schemas.openxmlformats.org/officeDocument/2006/relationships" xmlns:p="http://schemas.openxmlformats.org/presentationml/2006/main">
   <p:cSld>
     <p:spTree>
@@ -4415,72 +6183,89 @@
       </p:grpSpPr>
       <p:sp>
         <p:nvSpPr>
-          <p:cNvPr id="2" name="Rectangle 1"/>
-          <p:cNvSpPr/>
-          <p:nvPr/>
+          <p:cNvPr id="11266" name="Footer Placeholder 4"/>
+          <p:cNvSpPr>
+            <a:spLocks noGrp="1"/>
+          </p:cNvSpPr>
+          <p:nvPr>
+            <p:ph type="ftr" sz="quarter" idx="11"/>
+          </p:nvPr>
         </p:nvSpPr>
         <p:spPr>
-          <a:xfrm>
-            <a:off x="2438400" y="5029200"/>
-            <a:ext cx="4572000" cy="923330"/>
-          </a:xfrm>
-          <a:prstGeom prst="rect">
-            <a:avLst/>
-          </a:prstGeom>
+          <a:noFill/>
         </p:spPr>
         <p:txBody>
-          <a:bodyPr>
-            <a:spAutoFit/>
-          </a:bodyPr>
+          <a:bodyPr/>
           <a:lstStyle/>
           <a:p>
             <a:r>
-              <a:rPr lang="en-US" dirty="0" smtClean="0"/>
-              <a:t>http://hubblesite.org/the_telescope/hubble_essentials/graphics/telescope_essentials_howworks2_lg.gif</a:t>
-            </a:r>
-            <a:endParaRPr lang="en-US" dirty="0"/>
-          </a:p>
-        </p:txBody>
-      </p:sp>
-      <p:pic>
-        <p:nvPicPr>
-          <p:cNvPr id="3074" name="Picture 2"/>
-          <p:cNvPicPr>
-            <a:picLocks noChangeAspect="1" noChangeArrowheads="1"/>
-          </p:cNvPicPr>
-          <p:nvPr/>
-        </p:nvPicPr>
-        <p:blipFill>
-          <a:blip r:embed="rId2" cstate="print"/>
-          <a:srcRect/>
-          <a:stretch>
-            <a:fillRect/>
-          </a:stretch>
-        </p:blipFill>
-        <p:spPr bwMode="auto">
-          <a:xfrm>
-            <a:off x="1219200" y="762000"/>
-            <a:ext cx="6677025" cy="3867150"/>
-          </a:xfrm>
-          <a:prstGeom prst="rect">
-            <a:avLst/>
-          </a:prstGeom>
-          <a:noFill/>
-          <a:ln w="9525">
-            <a:noFill/>
-            <a:miter lim="800000"/>
-            <a:headEnd/>
-            <a:tailEnd/>
-          </a:ln>
-          <a:effectLst/>
-        </p:spPr>
-      </p:pic>
+              <a:rPr lang="en-US"/>
+              <a:t>R. Todd Lines</a:t>
+            </a:r>
+          </a:p>
+        </p:txBody>
+      </p:sp>
+      <p:sp>
+        <p:nvSpPr>
+          <p:cNvPr id="11267" name="Rectangle 2"/>
+          <p:cNvSpPr>
+            <a:spLocks noGrp="1" noChangeArrowheads="1"/>
+          </p:cNvSpPr>
+          <p:nvPr>
+            <p:ph type="title"/>
+          </p:nvPr>
+        </p:nvSpPr>
+        <p:spPr/>
+        <p:txBody>
+          <a:bodyPr/>
+          <a:lstStyle/>
+          <a:p>
+            <a:pPr eaLnBrk="1" hangingPunct="1"/>
+            <a:r>
+              <a:rPr lang="en-US"/>
+              <a:t>Magnification by a Lens</a:t>
+            </a:r>
+          </a:p>
+        </p:txBody>
+      </p:sp>
+      <p:sp>
+        <p:nvSpPr>
+          <p:cNvPr id="11268" name="Rectangle 3"/>
+          <p:cNvSpPr>
+            <a:spLocks noGrp="1" noChangeArrowheads="1"/>
+          </p:cNvSpPr>
+          <p:nvPr>
+            <p:ph type="body" idx="1"/>
+          </p:nvPr>
+        </p:nvSpPr>
+        <p:spPr/>
+        <p:txBody>
+          <a:bodyPr/>
+          <a:lstStyle/>
+          <a:p>
+            <a:pPr eaLnBrk="1" hangingPunct="1"/>
+            <a:r>
+              <a:rPr lang="en-US"/>
+              <a:t>With a single lens, it is possible to achieve angular magnification up to about 4 without serious aberrations</a:t>
+            </a:r>
+          </a:p>
+          <a:p>
+            <a:pPr eaLnBrk="1" hangingPunct="1"/>
+            <a:r>
+              <a:rPr lang="en-US"/>
+              <a:t>With multiple lenses, magnifications of up to about 20 can be achieved</a:t>
+            </a:r>
+          </a:p>
+          <a:p>
+            <a:pPr lvl="1" eaLnBrk="1" hangingPunct="1"/>
+            <a:r>
+              <a:rPr lang="en-US"/>
+              <a:t>The multiple lenses can correct for aberrations</a:t>
+            </a:r>
+          </a:p>
+        </p:txBody>
+      </p:sp>
     </p:spTree>
-    <p:extLst>
-      <p:ext uri="{BB962C8B-B14F-4D97-AF65-F5344CB8AC3E}">
-        <p14:creationId xmlns:p14="http://schemas.microsoft.com/office/powerpoint/2010/main" val="2432196983"/>
-      </p:ext>
-    </p:extLst>
   </p:cSld>
   <p:clrMapOvr>
     <a:masterClrMapping/>
@@ -4488,7 +6273,7 @@
 </p:sld>
 </file>
 
-<file path=ppt/slides/slide12.xml><?xml version="1.0" encoding="utf-8"?>
+<file path=ppt/slides/slide22.xml><?xml version="1.0" encoding="utf-8"?>
 <p:sld xmlns:a="http://schemas.openxmlformats.org/drawingml/2006/main" xmlns:r="http://schemas.openxmlformats.org/officeDocument/2006/relationships" xmlns:p="http://schemas.openxmlformats.org/presentationml/2006/main">
   <p:cSld>
     <p:spTree>
@@ -4507,6 +6292,89 @@
       </p:grpSpPr>
       <p:sp>
         <p:nvSpPr>
+          <p:cNvPr id="2" name="Title 1">
+            <a:extLst>
+              <a:ext uri="{FF2B5EF4-FFF2-40B4-BE49-F238E27FC236}">
+                <a16:creationId xmlns:a16="http://schemas.microsoft.com/office/drawing/2014/main" id="{1062A867-10CE-CCEE-1AF5-5945F8C5CF81}"/>
+              </a:ext>
+            </a:extLst>
+          </p:cNvPr>
+          <p:cNvSpPr>
+            <a:spLocks noGrp="1"/>
+          </p:cNvSpPr>
+          <p:nvPr>
+            <p:ph type="ctrTitle"/>
+          </p:nvPr>
+        </p:nvSpPr>
+        <p:spPr/>
+        <p:txBody>
+          <a:bodyPr/>
+          <a:lstStyle/>
+          <a:p>
+            <a:r>
+              <a:rPr lang="en-US" dirty="0"/>
+              <a:t>END</a:t>
+            </a:r>
+          </a:p>
+        </p:txBody>
+      </p:sp>
+      <p:sp>
+        <p:nvSpPr>
+          <p:cNvPr id="3" name="Subtitle 2">
+            <a:extLst>
+              <a:ext uri="{FF2B5EF4-FFF2-40B4-BE49-F238E27FC236}">
+                <a16:creationId xmlns:a16="http://schemas.microsoft.com/office/drawing/2014/main" id="{B729B2DC-9D67-EA05-E426-34867E0B9300}"/>
+              </a:ext>
+            </a:extLst>
+          </p:cNvPr>
+          <p:cNvSpPr>
+            <a:spLocks noGrp="1"/>
+          </p:cNvSpPr>
+          <p:nvPr>
+            <p:ph type="subTitle" idx="1"/>
+          </p:nvPr>
+        </p:nvSpPr>
+        <p:spPr/>
+        <p:txBody>
+          <a:bodyPr/>
+          <a:lstStyle/>
+          <a:p>
+            <a:endParaRPr lang="en-US"/>
+          </a:p>
+        </p:txBody>
+      </p:sp>
+    </p:spTree>
+    <p:extLst>
+      <p:ext uri="{BB962C8B-B14F-4D97-AF65-F5344CB8AC3E}">
+        <p14:creationId xmlns:p14="http://schemas.microsoft.com/office/powerpoint/2010/main" val="2869578996"/>
+      </p:ext>
+    </p:extLst>
+  </p:cSld>
+  <p:clrMapOvr>
+    <a:masterClrMapping/>
+  </p:clrMapOvr>
+</p:sld>
+</file>
+
+<file path=ppt/slides/slide23.xml><?xml version="1.0" encoding="utf-8"?>
+<p:sld xmlns:a="http://schemas.openxmlformats.org/drawingml/2006/main" xmlns:r="http://schemas.openxmlformats.org/officeDocument/2006/relationships" xmlns:p="http://schemas.openxmlformats.org/presentationml/2006/main">
+  <p:cSld>
+    <p:spTree>
+      <p:nvGrpSpPr>
+        <p:cNvPr id="1" name=""/>
+        <p:cNvGrpSpPr/>
+        <p:nvPr/>
+      </p:nvGrpSpPr>
+      <p:grpSpPr>
+        <a:xfrm>
+          <a:off x="0" y="0"/>
+          <a:ext cx="0" cy="0"/>
+          <a:chOff x="0" y="0"/>
+          <a:chExt cx="0" cy="0"/>
+        </a:xfrm>
+      </p:grpSpPr>
+      <p:sp>
+        <p:nvSpPr>
           <p:cNvPr id="184322" name="Slide Number Placeholder 3"/>
           <p:cNvSpPr>
             <a:spLocks noGrp="1"/>
@@ -4525,9 +6393,9 @@
             <a:fld id="{D9522729-DB03-484C-B934-8304638AC9B4}" type="slidenum">
               <a:rPr lang="en-US" smtClean="0"/>
               <a:pPr/>
-              <a:t>12</a:t>
+              <a:t>23</a:t>
             </a:fld>
-            <a:endParaRPr lang="en-US" smtClean="0"/>
+            <a:endParaRPr lang="en-US"/>
           </a:p>
         </p:txBody>
       </p:sp>
@@ -4566,21 +6434,8 @@
                   <a:schemeClr val="tx2"/>
                 </a:solidFill>
               </a:rPr>
-              <a:t>Question </a:t>
-            </a:r>
-            <a:r>
-              <a:rPr lang="en-US" sz="3600" dirty="0" smtClean="0">
-                <a:solidFill>
-                  <a:schemeClr val="tx2"/>
-                </a:solidFill>
-              </a:rPr>
-              <a:t>223.18.1</a:t>
-            </a:r>
-            <a:endParaRPr lang="en-US" sz="3600" dirty="0">
-              <a:solidFill>
-                <a:schemeClr val="tx2"/>
-              </a:solidFill>
-            </a:endParaRPr>
+              <a:t>Question 223.18.1</a:t>
+            </a:r>
           </a:p>
         </p:txBody>
       </p:sp>
@@ -4620,16 +6475,6 @@
               </a:spcBef>
             </a:pPr>
             <a:r>
-              <a:rPr lang="en-US" sz="2400" dirty="0" smtClean="0">
-                <a:solidFill>
-                  <a:srgbClr val="000000"/>
-                </a:solidFill>
-                <a:latin typeface="Times New Roman" pitchFamily="18" charset="0"/>
-                <a:cs typeface="Times New Roman" pitchFamily="18" charset="0"/>
-              </a:rPr>
-              <a:t>Two </a:t>
-            </a:r>
-            <a:r>
               <a:rPr lang="en-US" sz="2400" dirty="0">
                 <a:solidFill>
                   <a:srgbClr val="000000"/>
@@ -4637,7 +6482,7 @@
                 <a:latin typeface="Times New Roman" pitchFamily="18" charset="0"/>
                 <a:cs typeface="Times New Roman" pitchFamily="18" charset="0"/>
               </a:rPr>
-              <a:t>campers wish to start a fire during the day. One camper is nearsighted and one is farsighted. Whose glasses should be used to focus the Sun’s rays onto some paper to start the fire? </a:t>
+              <a:t>Two campers wish to start a fire during the day. One camper is nearsighted and one is farsighted. Whose glasses should be used to focus the Sun’s rays onto some paper to start the fire? </a:t>
             </a:r>
           </a:p>
           <a:p>
@@ -4743,17 +6588,10 @@
   <p:clrMapOvr>
     <a:masterClrMapping/>
   </p:clrMapOvr>
-  <p:timing>
-    <p:tnLst>
-      <p:par>
-        <p:cTn id="1" dur="indefinite" restart="never" nodeType="tmRoot"/>
-      </p:par>
-    </p:tnLst>
-  </p:timing>
 </p:sld>
 </file>
 
-<file path=ppt/slides/slide13.xml><?xml version="1.0" encoding="utf-8"?>
+<file path=ppt/slides/slide24.xml><?xml version="1.0" encoding="utf-8"?>
 <p:sld xmlns:a="http://schemas.openxmlformats.org/drawingml/2006/main" xmlns:r="http://schemas.openxmlformats.org/officeDocument/2006/relationships" xmlns:p="http://schemas.openxmlformats.org/presentationml/2006/main">
   <p:cSld>
     <p:spTree>
@@ -4826,10 +6664,9 @@
           <a:lstStyle/>
           <a:p>
             <a:r>
-              <a:rPr lang="en-US" sz="4400" dirty="0" smtClean="0"/>
+              <a:rPr lang="en-US" sz="4400" dirty="0"/>
               <a:t>Retina</a:t>
             </a:r>
-            <a:endParaRPr lang="en-US" sz="4400" dirty="0"/>
           </a:p>
         </p:txBody>
       </p:sp>
@@ -4856,10 +6693,9 @@
           <a:lstStyle/>
           <a:p>
             <a:r>
-              <a:rPr lang="en-US" sz="4400" dirty="0" smtClean="0"/>
+              <a:rPr lang="en-US" sz="4400" dirty="0"/>
               <a:t>Lens</a:t>
             </a:r>
-            <a:endParaRPr lang="en-US" sz="4400" dirty="0"/>
           </a:p>
         </p:txBody>
       </p:sp>
@@ -4886,10 +6722,9 @@
           <a:lstStyle/>
           <a:p>
             <a:r>
-              <a:rPr lang="en-US" sz="4400" dirty="0" smtClean="0"/>
+              <a:rPr lang="en-US" sz="4400" dirty="0"/>
               <a:t>Cornea</a:t>
             </a:r>
-            <a:endParaRPr lang="en-US" sz="4400" dirty="0"/>
           </a:p>
         </p:txBody>
       </p:sp>
@@ -5194,10 +7029,9 @@
           <a:lstStyle/>
           <a:p>
             <a:r>
-              <a:rPr lang="en-US" sz="3200" dirty="0" smtClean="0"/>
+              <a:rPr lang="en-US" sz="3200" dirty="0"/>
               <a:t>Aqueous humor</a:t>
             </a:r>
-            <a:endParaRPr lang="en-US" sz="3200" dirty="0"/>
           </a:p>
         </p:txBody>
       </p:sp>
@@ -5224,10 +7058,9 @@
           <a:lstStyle/>
           <a:p>
             <a:r>
-              <a:rPr lang="en-US" sz="3200" dirty="0" smtClean="0"/>
+              <a:rPr lang="en-US" sz="3200" dirty="0"/>
               <a:t>Vitreous humor</a:t>
             </a:r>
-            <a:endParaRPr lang="en-US" sz="3200" dirty="0"/>
           </a:p>
         </p:txBody>
       </p:sp>
@@ -5528,10 +7361,9 @@
           <a:lstStyle/>
           <a:p>
             <a:r>
-              <a:rPr lang="en-US" sz="3200" dirty="0" smtClean="0"/>
+              <a:rPr lang="en-US" sz="3200" dirty="0"/>
               <a:t>Pupil</a:t>
             </a:r>
-            <a:endParaRPr lang="en-US" sz="3200" dirty="0"/>
           </a:p>
         </p:txBody>
       </p:sp>
@@ -5640,7 +7472,7 @@
           <a:lstStyle/>
           <a:p>
             <a:r>
-              <a:rPr lang="en-US" sz="3200" dirty="0" err="1" smtClean="0"/>
+              <a:rPr lang="en-US" sz="3200" dirty="0" err="1"/>
               <a:t>Irisl</a:t>
             </a:r>
             <a:endParaRPr lang="en-US" sz="3200" dirty="0"/>
@@ -5660,7 +7492,7 @@
 </p:sld>
 </file>
 
-<file path=ppt/slides/slide14.xml><?xml version="1.0" encoding="utf-8"?>
+<file path=ppt/slides/slide25.xml><?xml version="1.0" encoding="utf-8"?>
 <p:sld xmlns:a="http://schemas.openxmlformats.org/drawingml/2006/main" xmlns:r="http://schemas.openxmlformats.org/officeDocument/2006/relationships" xmlns:p="http://schemas.openxmlformats.org/presentationml/2006/main">
   <p:cSld>
     <p:spTree>
@@ -7050,7 +8882,7 @@
 </p:sld>
 </file>
 
-<file path=ppt/slides/slide15.xml><?xml version="1.0" encoding="utf-8"?>
+<file path=ppt/slides/slide26.xml><?xml version="1.0" encoding="utf-8"?>
 <p:sld xmlns:a="http://schemas.openxmlformats.org/drawingml/2006/main" xmlns:r="http://schemas.openxmlformats.org/officeDocument/2006/relationships" xmlns:p="http://schemas.openxmlformats.org/presentationml/2006/main">
   <p:cSld>
     <p:spTree>
@@ -7083,10 +8915,9 @@
           <a:lstStyle/>
           <a:p>
             <a:r>
-              <a:rPr lang="en-US" dirty="0" smtClean="0"/>
+              <a:rPr lang="en-US" dirty="0"/>
               <a:t>Question 223.18.2</a:t>
             </a:r>
-            <a:endParaRPr lang="en-US" dirty="0"/>
           </a:p>
         </p:txBody>
       </p:sp>
@@ -7109,7 +8940,7 @@
               <a:buNone/>
             </a:pPr>
             <a:r>
-              <a:rPr lang="en-US" dirty="0" smtClean="0"/>
+              <a:rPr lang="en-US" dirty="0"/>
               <a:t>What do biologists call the process of focusing the light in the eye?</a:t>
             </a:r>
           </a:p>
@@ -7119,7 +8950,7 @@
               <a:buAutoNum type="alphaLcParenR"/>
             </a:pPr>
             <a:r>
-              <a:rPr lang="en-US" dirty="0" smtClean="0"/>
+              <a:rPr lang="en-US" dirty="0"/>
               <a:t>focusing</a:t>
             </a:r>
           </a:p>
@@ -7129,7 +8960,7 @@
               <a:buAutoNum type="alphaLcParenR"/>
             </a:pPr>
             <a:r>
-              <a:rPr lang="en-US" dirty="0" smtClean="0"/>
+              <a:rPr lang="en-US" dirty="0"/>
               <a:t>accommodation</a:t>
             </a:r>
           </a:p>
@@ -7139,7 +8970,7 @@
               <a:buAutoNum type="alphaLcParenR"/>
             </a:pPr>
             <a:r>
-              <a:rPr lang="en-US" dirty="0" smtClean="0"/>
+              <a:rPr lang="en-US" dirty="0"/>
               <a:t>image formation</a:t>
             </a:r>
           </a:p>
@@ -7149,18 +8980,17 @@
               <a:buAutoNum type="alphaLcParenR"/>
             </a:pPr>
             <a:r>
-              <a:rPr lang="en-US" dirty="0" smtClean="0"/>
+              <a:rPr lang="en-US" dirty="0"/>
               <a:t>Contraction of the </a:t>
             </a:r>
             <a:r>
-              <a:rPr lang="en-US" dirty="0" err="1" smtClean="0"/>
+              <a:rPr lang="en-US" dirty="0" err="1"/>
               <a:t>ciliary</a:t>
             </a:r>
             <a:r>
-              <a:rPr lang="en-US" dirty="0" smtClean="0"/>
+              <a:rPr lang="en-US" dirty="0"/>
               <a:t> muscle</a:t>
             </a:r>
-            <a:endParaRPr lang="en-US" dirty="0"/>
           </a:p>
         </p:txBody>
       </p:sp>
@@ -7187,7 +9017,7 @@
               <a:pPr>
                 <a:defRPr/>
               </a:pPr>
-              <a:t>15</a:t>
+              <a:t>26</a:t>
             </a:fld>
             <a:endParaRPr lang="en-US"/>
           </a:p>
@@ -7206,7 +9036,7 @@
 </p:sld>
 </file>
 
-<file path=ppt/slides/slide16.xml><?xml version="1.0" encoding="utf-8"?>
+<file path=ppt/slides/slide27.xml><?xml version="1.0" encoding="utf-8"?>
 <p:sld xmlns:a="http://schemas.openxmlformats.org/drawingml/2006/main" xmlns:r="http://schemas.openxmlformats.org/officeDocument/2006/relationships" xmlns:p="http://schemas.openxmlformats.org/presentationml/2006/main">
   <p:cSld>
     <p:spTree>
@@ -7278,7 +9108,7 @@
           <a:lstStyle/>
           <a:p>
             <a:r>
-              <a:rPr lang="en-US" sz="4000" dirty="0" smtClean="0">
+              <a:rPr lang="en-US" sz="4000" dirty="0">
                 <a:solidFill>
                   <a:srgbClr val="00B050"/>
                 </a:solidFill>
@@ -7309,25 +9139,25 @@
           <a:lstStyle/>
           <a:p>
             <a:r>
-              <a:rPr lang="en-US" sz="2000" smtClean="0"/>
+              <a:rPr lang="en-US" sz="2000"/>
               <a:t>Accommodation refers to  dynamic changes in the shape of the lens.</a:t>
             </a:r>
           </a:p>
           <a:p>
             <a:r>
-              <a:rPr lang="en-US" sz="2000" smtClean="0"/>
+              <a:rPr lang="en-US" sz="2000"/>
               <a:t>As an object comes within about 20 feet the light rays originating at a point are no longer considered to be parallel.</a:t>
             </a:r>
           </a:p>
           <a:p>
             <a:r>
-              <a:rPr lang="en-US" sz="2000" smtClean="0"/>
+              <a:rPr lang="en-US" sz="2000"/>
               <a:t>Rather these light rays diverge and a greater refractive power is required to bring them into focus. </a:t>
             </a:r>
           </a:p>
           <a:p>
             <a:r>
-              <a:rPr lang="en-US" sz="2000" smtClean="0"/>
+              <a:rPr lang="en-US" sz="2000"/>
               <a:t>The lens can contribute about 12 or more diopters to the focusing of light rays on the back of the eye by rounding up.</a:t>
             </a:r>
           </a:p>
@@ -7343,17 +9173,10 @@
   <p:clrMapOvr>
     <a:masterClrMapping/>
   </p:clrMapOvr>
-  <p:timing>
-    <p:tnLst>
-      <p:par>
-        <p:cTn id="1" dur="indefinite" restart="never" nodeType="tmRoot"/>
-      </p:par>
-    </p:tnLst>
-  </p:timing>
 </p:sld>
 </file>
 
-<file path=ppt/slides/slide17.xml><?xml version="1.0" encoding="utf-8"?>
+<file path=ppt/slides/slide28.xml><?xml version="1.0" encoding="utf-8"?>
 <p:sld xmlns:a="http://schemas.openxmlformats.org/drawingml/2006/main" xmlns:r="http://schemas.openxmlformats.org/officeDocument/2006/relationships" xmlns:p="http://schemas.openxmlformats.org/presentationml/2006/main">
   <p:cSld>
     <p:spTree>
@@ -7386,10 +9209,9 @@
           <a:lstStyle/>
           <a:p>
             <a:r>
-              <a:rPr lang="en-US" dirty="0" smtClean="0"/>
+              <a:rPr lang="en-US" dirty="0"/>
               <a:t>Question 223.18.3</a:t>
             </a:r>
-            <a:endParaRPr lang="en-US" dirty="0"/>
           </a:p>
         </p:txBody>
       </p:sp>
@@ -7412,7 +9234,7 @@
               <a:buNone/>
             </a:pPr>
             <a:r>
-              <a:rPr lang="en-US" dirty="0" smtClean="0"/>
+              <a:rPr lang="en-US" dirty="0"/>
               <a:t>What do we call the position of the closest thing we can see?</a:t>
             </a:r>
           </a:p>
@@ -7422,7 +9244,7 @@
               <a:buAutoNum type="alphaLcParenR"/>
             </a:pPr>
             <a:r>
-              <a:rPr lang="en-US" dirty="0" smtClean="0"/>
+              <a:rPr lang="en-US" dirty="0"/>
               <a:t>Near point</a:t>
             </a:r>
           </a:p>
@@ -7432,7 +9254,7 @@
               <a:buAutoNum type="alphaLcParenR"/>
             </a:pPr>
             <a:r>
-              <a:rPr lang="en-US" dirty="0" smtClean="0"/>
+              <a:rPr lang="en-US" dirty="0"/>
               <a:t>Far point</a:t>
             </a:r>
           </a:p>
@@ -7442,7 +9264,7 @@
               <a:buAutoNum type="alphaLcParenR"/>
             </a:pPr>
             <a:r>
-              <a:rPr lang="en-US" dirty="0" smtClean="0"/>
+              <a:rPr lang="en-US" dirty="0"/>
               <a:t>Squint point</a:t>
             </a:r>
           </a:p>
@@ -7452,10 +9274,9 @@
               <a:buAutoNum type="alphaLcParenR"/>
             </a:pPr>
             <a:r>
-              <a:rPr lang="en-US" dirty="0" smtClean="0"/>
+              <a:rPr lang="en-US" dirty="0"/>
               <a:t>conjunctiva</a:t>
             </a:r>
-            <a:endParaRPr lang="en-US" dirty="0"/>
           </a:p>
         </p:txBody>
       </p:sp>
@@ -7482,7 +9303,7 @@
               <a:pPr>
                 <a:defRPr/>
               </a:pPr>
-              <a:t>17</a:t>
+              <a:t>28</a:t>
             </a:fld>
             <a:endParaRPr lang="en-US"/>
           </a:p>
@@ -7501,7 +9322,7 @@
 </p:sld>
 </file>
 
-<file path=ppt/slides/slide18.xml><?xml version="1.0" encoding="utf-8"?>
+<file path=ppt/slides/slide29.xml><?xml version="1.0" encoding="utf-8"?>
 <p:sld xmlns:a="http://schemas.openxmlformats.org/drawingml/2006/main" xmlns:r="http://schemas.openxmlformats.org/officeDocument/2006/relationships" xmlns:p="http://schemas.openxmlformats.org/presentationml/2006/main">
   <p:cSld>
     <p:spTree>
@@ -7567,7 +9388,7 @@
           <a:p>
             <a:pPr eaLnBrk="1" hangingPunct="1"/>
             <a:r>
-              <a:rPr lang="en-US" sz="3200" dirty="0" smtClean="0"/>
+              <a:rPr lang="en-US" sz="3200" dirty="0"/>
               <a:t>Myopia and Other Refractive Errors</a:t>
             </a:r>
           </a:p>
@@ -7594,7 +9415,7 @@
           <a:lstStyle/>
           <a:p>
             <a:r>
-              <a:rPr lang="en-US" sz="2400" dirty="0" smtClean="0">
+              <a:rPr lang="en-US" sz="2400" dirty="0">
                 <a:solidFill>
                   <a:srgbClr val="00B050"/>
                 </a:solidFill>
@@ -7602,34 +9423,34 @@
               <a:t>Myopia </a:t>
             </a:r>
             <a:r>
-              <a:rPr lang="en-US" sz="2400" dirty="0" smtClean="0"/>
+              <a:rPr lang="en-US" sz="2400" dirty="0"/>
               <a:t>– nearsightedness </a:t>
             </a:r>
           </a:p>
           <a:p>
             <a:pPr lvl="1"/>
             <a:r>
-              <a:rPr lang="en-US" sz="2000" dirty="0" smtClean="0"/>
+              <a:rPr lang="en-US" sz="2000" dirty="0"/>
               <a:t>The ability to see close objects clearly but distant objects are blurry</a:t>
             </a:r>
           </a:p>
           <a:p>
             <a:pPr lvl="1"/>
             <a:r>
-              <a:rPr lang="en-US" sz="2000" dirty="0" smtClean="0"/>
+              <a:rPr lang="en-US" sz="2000" dirty="0"/>
               <a:t>Cornea and lens focus object in front of the retina</a:t>
             </a:r>
           </a:p>
           <a:p>
             <a:pPr lvl="1"/>
             <a:r>
-              <a:rPr lang="en-US" sz="2000" dirty="0" smtClean="0"/>
+              <a:rPr lang="en-US" sz="2000" dirty="0"/>
               <a:t>Corrected by concave lens (minus lens), radial keratotomy, laser corneal sculpting.</a:t>
             </a:r>
           </a:p>
           <a:p>
             <a:r>
-              <a:rPr lang="en-US" sz="2400" dirty="0" err="1" smtClean="0">
+              <a:rPr lang="en-US" sz="2400" dirty="0" err="1">
                 <a:solidFill>
                   <a:srgbClr val="00B050"/>
                 </a:solidFill>
@@ -7637,28 +9458,28 @@
               <a:t>Hyperopia</a:t>
             </a:r>
             <a:r>
-              <a:rPr lang="en-US" sz="2400" dirty="0" smtClean="0"/>
+              <a:rPr lang="en-US" sz="2400" dirty="0"/>
               <a:t> - farsightedness</a:t>
             </a:r>
           </a:p>
           <a:p>
             <a:pPr lvl="1"/>
             <a:r>
-              <a:rPr lang="en-US" sz="2000" dirty="0" smtClean="0"/>
+              <a:rPr lang="en-US" sz="2000" dirty="0"/>
               <a:t>Ability to see distant objects but close objects are blurry</a:t>
             </a:r>
           </a:p>
           <a:p>
             <a:pPr lvl="1"/>
             <a:r>
-              <a:rPr lang="en-US" sz="2000" dirty="0" smtClean="0"/>
+              <a:rPr lang="en-US" sz="2000" dirty="0"/>
               <a:t>Image is focused behind the retina.</a:t>
             </a:r>
           </a:p>
           <a:p>
             <a:pPr lvl="1"/>
             <a:r>
-              <a:rPr lang="en-US" sz="2000" dirty="0" smtClean="0"/>
+              <a:rPr lang="en-US" sz="2000" dirty="0"/>
               <a:t>Corrected by convex lenses.</a:t>
             </a:r>
           </a:p>
@@ -7674,17 +9495,147 @@
   <p:clrMapOvr>
     <a:masterClrMapping/>
   </p:clrMapOvr>
-  <p:timing>
-    <p:tnLst>
-      <p:par>
-        <p:cTn id="1" dur="indefinite" restart="never" nodeType="tmRoot"/>
-      </p:par>
-    </p:tnLst>
-  </p:timing>
 </p:sld>
 </file>
 
-<file path=ppt/slides/slide19.xml><?xml version="1.0" encoding="utf-8"?>
+<file path=ppt/slides/slide3.xml><?xml version="1.0" encoding="utf-8"?>
+<p:sld xmlns:a="http://schemas.openxmlformats.org/drawingml/2006/main" xmlns:r="http://schemas.openxmlformats.org/officeDocument/2006/relationships" xmlns:p="http://schemas.openxmlformats.org/presentationml/2006/main">
+  <p:cSld>
+    <p:spTree>
+      <p:nvGrpSpPr>
+        <p:cNvPr id="1" name=""/>
+        <p:cNvGrpSpPr/>
+        <p:nvPr/>
+      </p:nvGrpSpPr>
+      <p:grpSpPr>
+        <a:xfrm>
+          <a:off x="0" y="0"/>
+          <a:ext cx="0" cy="0"/>
+          <a:chOff x="0" y="0"/>
+          <a:chExt cx="0" cy="0"/>
+        </a:xfrm>
+      </p:grpSpPr>
+      <p:sp>
+        <p:nvSpPr>
+          <p:cNvPr id="2" name="Title 1"/>
+          <p:cNvSpPr>
+            <a:spLocks noGrp="1"/>
+          </p:cNvSpPr>
+          <p:nvPr>
+            <p:ph type="title"/>
+          </p:nvPr>
+        </p:nvSpPr>
+        <p:spPr/>
+        <p:txBody>
+          <a:bodyPr/>
+          <a:lstStyle/>
+          <a:p>
+            <a:endParaRPr lang="en-US"/>
+          </a:p>
+        </p:txBody>
+      </p:sp>
+      <p:sp>
+        <p:nvSpPr>
+          <p:cNvPr id="3" name="Content Placeholder 2"/>
+          <p:cNvSpPr>
+            <a:spLocks noGrp="1"/>
+          </p:cNvSpPr>
+          <p:nvPr>
+            <p:ph idx="1"/>
+          </p:nvPr>
+        </p:nvSpPr>
+        <p:spPr/>
+        <p:txBody>
+          <a:bodyPr/>
+          <a:lstStyle/>
+          <a:p>
+            <a:endParaRPr lang="en-US"/>
+          </a:p>
+        </p:txBody>
+      </p:sp>
+      <p:pic>
+        <p:nvPicPr>
+          <p:cNvPr id="1026" name="Picture 2" descr="http://www.imaging-resource.com/PRODS/NEX5/znew5phantom_500.jpg"/>
+          <p:cNvPicPr>
+            <a:picLocks noChangeAspect="1" noChangeArrowheads="1"/>
+          </p:cNvPicPr>
+          <p:nvPr/>
+        </p:nvPicPr>
+        <p:blipFill>
+          <a:blip r:embed="rId2">
+            <a:extLst>
+              <a:ext uri="{28A0092B-C50C-407E-A947-70E740481C1C}">
+                <a14:useLocalDpi xmlns:a14="http://schemas.microsoft.com/office/drawing/2010/main" val="0"/>
+              </a:ext>
+            </a:extLst>
+          </a:blip>
+          <a:srcRect/>
+          <a:stretch>
+            <a:fillRect/>
+          </a:stretch>
+        </p:blipFill>
+        <p:spPr bwMode="auto">
+          <a:xfrm>
+            <a:off x="1371600" y="836762"/>
+            <a:ext cx="6115050" cy="5356785"/>
+          </a:xfrm>
+          <a:prstGeom prst="rect">
+            <a:avLst/>
+          </a:prstGeom>
+          <a:noFill/>
+          <a:extLst>
+            <a:ext uri="{909E8E84-426E-40DD-AFC4-6F175D3DCCD1}">
+              <a14:hiddenFill xmlns:a14="http://schemas.microsoft.com/office/drawing/2010/main">
+                <a:solidFill>
+                  <a:srgbClr val="FFFFFF"/>
+                </a:solidFill>
+              </a14:hiddenFill>
+            </a:ext>
+          </a:extLst>
+        </p:spPr>
+      </p:pic>
+      <p:sp>
+        <p:nvSpPr>
+          <p:cNvPr id="4" name="Rectangle 3"/>
+          <p:cNvSpPr/>
+          <p:nvPr/>
+        </p:nvSpPr>
+        <p:spPr>
+          <a:xfrm>
+            <a:off x="4430204" y="5516002"/>
+            <a:ext cx="3429000" cy="507831"/>
+          </a:xfrm>
+          <a:prstGeom prst="rect">
+            <a:avLst/>
+          </a:prstGeom>
+        </p:spPr>
+        <p:txBody>
+          <a:bodyPr>
+            <a:spAutoFit/>
+          </a:bodyPr>
+          <a:lstStyle/>
+          <a:p>
+            <a:r>
+              <a:rPr lang="en-US" sz="1350" dirty="0"/>
+              <a:t>http://www.imaging-resource.com/PRODS/NEX5/NEX5A.HTM</a:t>
+            </a:r>
+          </a:p>
+        </p:txBody>
+      </p:sp>
+    </p:spTree>
+    <p:extLst>
+      <p:ext uri="{BB962C8B-B14F-4D97-AF65-F5344CB8AC3E}">
+        <p14:creationId xmlns:p14="http://schemas.microsoft.com/office/powerpoint/2010/main" val="1756771673"/>
+      </p:ext>
+    </p:extLst>
+  </p:cSld>
+  <p:clrMapOvr>
+    <a:masterClrMapping/>
+  </p:clrMapOvr>
+</p:sld>
+</file>
+
+<file path=ppt/slides/slide30.xml><?xml version="1.0" encoding="utf-8"?>
 <p:sld xmlns:a="http://schemas.openxmlformats.org/drawingml/2006/main" xmlns:r="http://schemas.openxmlformats.org/officeDocument/2006/relationships" xmlns:p="http://schemas.openxmlformats.org/presentationml/2006/main">
   <p:cSld>
     <p:spTree>
@@ -11596,7 +13547,7 @@
           <a:lstStyle/>
           <a:p>
             <a:r>
-              <a:rPr lang="en-US" dirty="0" smtClean="0"/>
+              <a:rPr lang="en-US" dirty="0"/>
               <a:t>Myopia – nearsightedness </a:t>
             </a:r>
           </a:p>
@@ -11624,11 +13575,11 @@
           <a:lstStyle/>
           <a:p>
             <a:r>
-              <a:rPr lang="en-US" dirty="0" err="1" smtClean="0"/>
+              <a:rPr lang="en-US" dirty="0" err="1"/>
               <a:t>Hyperopia</a:t>
             </a:r>
             <a:r>
-              <a:rPr lang="en-US" dirty="0" smtClean="0"/>
+              <a:rPr lang="en-US" dirty="0"/>
               <a:t> - farsightedness</a:t>
             </a:r>
           </a:p>
@@ -11656,7 +13607,7 @@
           <a:lstStyle/>
           <a:p>
             <a:r>
-              <a:rPr lang="en-US" dirty="0" smtClean="0"/>
+              <a:rPr lang="en-US" dirty="0"/>
               <a:t>Normal</a:t>
             </a:r>
           </a:p>
@@ -11675,144 +13626,7 @@
 </p:sld>
 </file>
 
-<file path=ppt/slides/slide2.xml><?xml version="1.0" encoding="utf-8"?>
-<p:sld xmlns:a="http://schemas.openxmlformats.org/drawingml/2006/main" xmlns:r="http://schemas.openxmlformats.org/officeDocument/2006/relationships" xmlns:p="http://schemas.openxmlformats.org/presentationml/2006/main">
-  <p:cSld>
-    <p:spTree>
-      <p:nvGrpSpPr>
-        <p:cNvPr id="1" name=""/>
-        <p:cNvGrpSpPr/>
-        <p:nvPr/>
-      </p:nvGrpSpPr>
-      <p:grpSpPr>
-        <a:xfrm>
-          <a:off x="0" y="0"/>
-          <a:ext cx="0" cy="0"/>
-          <a:chOff x="0" y="0"/>
-          <a:chExt cx="0" cy="0"/>
-        </a:xfrm>
-      </p:grpSpPr>
-      <p:sp>
-        <p:nvSpPr>
-          <p:cNvPr id="2" name="Title 1"/>
-          <p:cNvSpPr>
-            <a:spLocks noGrp="1"/>
-          </p:cNvSpPr>
-          <p:nvPr>
-            <p:ph type="title"/>
-          </p:nvPr>
-        </p:nvSpPr>
-        <p:spPr/>
-        <p:txBody>
-          <a:bodyPr/>
-          <a:lstStyle/>
-          <a:p>
-            <a:endParaRPr lang="en-US"/>
-          </a:p>
-        </p:txBody>
-      </p:sp>
-      <p:sp>
-        <p:nvSpPr>
-          <p:cNvPr id="3" name="Content Placeholder 2"/>
-          <p:cNvSpPr>
-            <a:spLocks noGrp="1"/>
-          </p:cNvSpPr>
-          <p:nvPr>
-            <p:ph idx="1"/>
-          </p:nvPr>
-        </p:nvSpPr>
-        <p:spPr/>
-        <p:txBody>
-          <a:bodyPr/>
-          <a:lstStyle/>
-          <a:p>
-            <a:endParaRPr lang="en-US"/>
-          </a:p>
-        </p:txBody>
-      </p:sp>
-      <p:pic>
-        <p:nvPicPr>
-          <p:cNvPr id="1026" name="Picture 2" descr="http://www.imaging-resource.com/PRODS/NEX5/znew5phantom_500.jpg"/>
-          <p:cNvPicPr>
-            <a:picLocks noChangeAspect="1" noChangeArrowheads="1"/>
-          </p:cNvPicPr>
-          <p:nvPr/>
-        </p:nvPicPr>
-        <p:blipFill>
-          <a:blip r:embed="rId2">
-            <a:extLst>
-              <a:ext uri="{28A0092B-C50C-407E-A947-70E740481C1C}">
-                <a14:useLocalDpi xmlns:a14="http://schemas.microsoft.com/office/drawing/2010/main" val="0"/>
-              </a:ext>
-            </a:extLst>
-          </a:blip>
-          <a:srcRect/>
-          <a:stretch>
-            <a:fillRect/>
-          </a:stretch>
-        </p:blipFill>
-        <p:spPr bwMode="auto">
-          <a:xfrm>
-            <a:off x="1371600" y="836762"/>
-            <a:ext cx="6115050" cy="5356785"/>
-          </a:xfrm>
-          <a:prstGeom prst="rect">
-            <a:avLst/>
-          </a:prstGeom>
-          <a:noFill/>
-          <a:extLst>
-            <a:ext uri="{909E8E84-426E-40DD-AFC4-6F175D3DCCD1}">
-              <a14:hiddenFill xmlns:a14="http://schemas.microsoft.com/office/drawing/2010/main">
-                <a:solidFill>
-                  <a:srgbClr val="FFFFFF"/>
-                </a:solidFill>
-              </a14:hiddenFill>
-            </a:ext>
-          </a:extLst>
-        </p:spPr>
-      </p:pic>
-      <p:sp>
-        <p:nvSpPr>
-          <p:cNvPr id="4" name="Rectangle 3"/>
-          <p:cNvSpPr/>
-          <p:nvPr/>
-        </p:nvSpPr>
-        <p:spPr>
-          <a:xfrm>
-            <a:off x="4430204" y="5516002"/>
-            <a:ext cx="3429000" cy="507831"/>
-          </a:xfrm>
-          <a:prstGeom prst="rect">
-            <a:avLst/>
-          </a:prstGeom>
-        </p:spPr>
-        <p:txBody>
-          <a:bodyPr>
-            <a:spAutoFit/>
-          </a:bodyPr>
-          <a:lstStyle/>
-          <a:p>
-            <a:r>
-              <a:rPr lang="en-US" sz="1350" dirty="0"/>
-              <a:t>http://www.imaging-resource.com/PRODS/NEX5/NEX5A.HTM</a:t>
-            </a:r>
-          </a:p>
-        </p:txBody>
-      </p:sp>
-    </p:spTree>
-    <p:extLst>
-      <p:ext uri="{BB962C8B-B14F-4D97-AF65-F5344CB8AC3E}">
-        <p14:creationId xmlns:p14="http://schemas.microsoft.com/office/powerpoint/2010/main" val="1756771673"/>
-      </p:ext>
-    </p:extLst>
-  </p:cSld>
-  <p:clrMapOvr>
-    <a:masterClrMapping/>
-  </p:clrMapOvr>
-</p:sld>
-</file>
-
-<file path=ppt/slides/slide20.xml><?xml version="1.0" encoding="utf-8"?>
+<file path=ppt/slides/slide31.xml><?xml version="1.0" encoding="utf-8"?>
 <p:sld xmlns:a="http://schemas.openxmlformats.org/drawingml/2006/main" xmlns:r="http://schemas.openxmlformats.org/officeDocument/2006/relationships" xmlns:p="http://schemas.openxmlformats.org/presentationml/2006/main">
   <p:cSld>
     <p:spTree>
@@ -11884,7 +13698,7 @@
           <a:lstStyle/>
           <a:p>
             <a:r>
-              <a:rPr lang="en-US" sz="3200" smtClean="0"/>
+              <a:rPr lang="en-US" sz="3200"/>
               <a:t>Myopia and Other Refractive Errors</a:t>
             </a:r>
           </a:p>
@@ -11913,7 +13727,7 @@
           <a:lstStyle/>
           <a:p>
             <a:r>
-              <a:rPr lang="en-US" sz="2400" dirty="0" err="1" smtClean="0">
+              <a:rPr lang="en-US" sz="2400" dirty="0" err="1">
                 <a:solidFill>
                   <a:srgbClr val="00B050"/>
                 </a:solidFill>
@@ -11921,44 +13735,44 @@
               <a:t>Presbyopia</a:t>
             </a:r>
             <a:r>
-              <a:rPr lang="en-US" sz="2400" dirty="0" smtClean="0"/>
+              <a:rPr lang="en-US" sz="2400" dirty="0"/>
               <a:t> - degeneration of accommodation</a:t>
             </a:r>
           </a:p>
           <a:p>
             <a:pPr lvl="1"/>
             <a:r>
-              <a:rPr lang="en-US" sz="2000" dirty="0" smtClean="0"/>
+              <a:rPr lang="en-US" sz="2000" dirty="0"/>
               <a:t>Lens becomes less flexible with age probably because new cells are being generated but old ones are not being destroyed.</a:t>
             </a:r>
           </a:p>
           <a:p>
             <a:pPr lvl="1"/>
             <a:r>
-              <a:rPr lang="en-US" sz="2000" dirty="0" smtClean="0"/>
+              <a:rPr lang="en-US" sz="2000" dirty="0"/>
               <a:t>Near point of vision has increased past 9 inches</a:t>
             </a:r>
           </a:p>
           <a:p>
             <a:pPr lvl="1"/>
             <a:r>
-              <a:rPr lang="en-US" sz="2000" dirty="0" smtClean="0"/>
+              <a:rPr lang="en-US" sz="2000" dirty="0"/>
               <a:t>Generally develops after 40 years or in people who do fine, close work.</a:t>
             </a:r>
           </a:p>
           <a:p>
             <a:pPr lvl="1"/>
             <a:r>
-              <a:rPr lang="en-US" sz="2000" dirty="0" smtClean="0"/>
+              <a:rPr lang="en-US" sz="2000" dirty="0"/>
               <a:t>What is your near point of vision?</a:t>
             </a:r>
           </a:p>
           <a:p>
             <a:r>
-              <a:rPr lang="en-US" sz="2400" dirty="0" smtClean="0"/>
+              <a:rPr lang="en-US" sz="2400" dirty="0"/>
               <a:t>Corrected by “reading glasses” or bifocal glasses used only for close work.</a:t>
             </a:r>
-            <a:endParaRPr lang="en-US" dirty="0" smtClean="0"/>
+            <a:endParaRPr lang="en-US" dirty="0"/>
           </a:p>
         </p:txBody>
       </p:sp>
@@ -11972,17 +13786,10 @@
   <p:clrMapOvr>
     <a:masterClrMapping/>
   </p:clrMapOvr>
-  <p:timing>
-    <p:tnLst>
-      <p:par>
-        <p:cTn id="1" dur="indefinite" restart="never" nodeType="tmRoot"/>
-      </p:par>
-    </p:tnLst>
-  </p:timing>
 </p:sld>
 </file>
 
-<file path=ppt/slides/slide21.xml><?xml version="1.0" encoding="utf-8"?>
+<file path=ppt/slides/slide32.xml><?xml version="1.0" encoding="utf-8"?>
 <p:sld xmlns:a="http://schemas.openxmlformats.org/drawingml/2006/main" xmlns:r="http://schemas.openxmlformats.org/officeDocument/2006/relationships" xmlns:p="http://schemas.openxmlformats.org/presentationml/2006/main">
   <p:cSld>
     <p:spTree>
@@ -12015,10 +13822,9 @@
           <a:lstStyle/>
           <a:p>
             <a:r>
-              <a:rPr lang="en-US" dirty="0" smtClean="0"/>
+              <a:rPr lang="en-US" dirty="0"/>
               <a:t>Question 223.18.4</a:t>
             </a:r>
-            <a:endParaRPr lang="en-US" dirty="0"/>
           </a:p>
         </p:txBody>
       </p:sp>
@@ -12041,15 +13847,15 @@
               <a:buNone/>
             </a:pPr>
             <a:r>
-              <a:rPr lang="en-US" dirty="0" smtClean="0"/>
+              <a:rPr lang="en-US" dirty="0"/>
               <a:t>What is the power (in </a:t>
             </a:r>
             <a:r>
-              <a:rPr lang="en-US" dirty="0" err="1" smtClean="0"/>
+              <a:rPr lang="en-US" dirty="0" err="1"/>
               <a:t>Diopters</a:t>
             </a:r>
             <a:r>
-              <a:rPr lang="en-US" dirty="0" smtClean="0"/>
+              <a:rPr lang="en-US" dirty="0"/>
               <a:t>) of a lens with a focal distance of 0.5m?</a:t>
             </a:r>
           </a:p>
@@ -12059,7 +13865,7 @@
               <a:buAutoNum type="alphaLcParenR"/>
             </a:pPr>
             <a:r>
-              <a:rPr lang="en-US" dirty="0" smtClean="0"/>
+              <a:rPr lang="en-US" dirty="0"/>
               <a:t>5</a:t>
             </a:r>
           </a:p>
@@ -12069,7 +13875,7 @@
               <a:buAutoNum type="alphaLcParenR"/>
             </a:pPr>
             <a:r>
-              <a:rPr lang="en-US" dirty="0" smtClean="0"/>
+              <a:rPr lang="en-US" dirty="0"/>
               <a:t>4</a:t>
             </a:r>
           </a:p>
@@ -12079,7 +13885,7 @@
               <a:buAutoNum type="alphaLcParenR"/>
             </a:pPr>
             <a:r>
-              <a:rPr lang="en-US" dirty="0" smtClean="0"/>
+              <a:rPr lang="en-US" dirty="0"/>
               <a:t>3</a:t>
             </a:r>
           </a:p>
@@ -12089,7 +13895,7 @@
               <a:buAutoNum type="alphaLcParenR"/>
             </a:pPr>
             <a:r>
-              <a:rPr lang="en-US" dirty="0" smtClean="0"/>
+              <a:rPr lang="en-US" dirty="0"/>
               <a:t>2</a:t>
             </a:r>
           </a:p>
@@ -12099,10 +13905,9 @@
               <a:buAutoNum type="alphaLcParenR"/>
             </a:pPr>
             <a:r>
-              <a:rPr lang="en-US" dirty="0" smtClean="0"/>
+              <a:rPr lang="en-US" dirty="0"/>
               <a:t>1</a:t>
             </a:r>
-            <a:endParaRPr lang="en-US" dirty="0"/>
           </a:p>
         </p:txBody>
       </p:sp>
@@ -12129,7 +13934,7 @@
               <a:pPr>
                 <a:defRPr/>
               </a:pPr>
-              <a:t>21</a:t>
+              <a:t>32</a:t>
             </a:fld>
             <a:endParaRPr lang="en-US"/>
           </a:p>
@@ -12148,7 +13953,7 @@
 </p:sld>
 </file>
 
-<file path=ppt/slides/slide22.xml><?xml version="1.0" encoding="utf-8"?>
+<file path=ppt/slides/slide33.xml><?xml version="1.0" encoding="utf-8"?>
 <p:sld xmlns:a="http://schemas.openxmlformats.org/drawingml/2006/main" xmlns:r="http://schemas.openxmlformats.org/officeDocument/2006/relationships" xmlns:p="http://schemas.openxmlformats.org/presentationml/2006/main">
   <p:cSld>
     <p:spTree>
@@ -12964,7 +14769,7 @@
 </p:sld>
 </file>
 
-<file path=ppt/slides/slide23.xml><?xml version="1.0" encoding="utf-8"?>
+<file path=ppt/slides/slide34.xml><?xml version="1.0" encoding="utf-8"?>
 <p:sld xmlns:a="http://schemas.openxmlformats.org/drawingml/2006/main" xmlns:r="http://schemas.openxmlformats.org/officeDocument/2006/relationships" xmlns:p="http://schemas.openxmlformats.org/presentationml/2006/main">
   <p:cSld>
     <p:spTree>
@@ -13600,7 +15405,7 @@
 </p:sld>
 </file>
 
-<file path=ppt/slides/slide3.xml><?xml version="1.0" encoding="utf-8"?>
+<file path=ppt/slides/slide4.xml><?xml version="1.0" encoding="utf-8"?>
 <p:sld xmlns:a="http://schemas.openxmlformats.org/drawingml/2006/main" xmlns:r="http://schemas.openxmlformats.org/officeDocument/2006/relationships" xmlns:p="http://schemas.openxmlformats.org/presentationml/2006/main">
   <p:cSld>
     <p:spTree>
@@ -13737,7 +15542,7 @@
 </p:sld>
 </file>
 
-<file path=ppt/slides/slide4.xml><?xml version="1.0" encoding="utf-8"?>
+<file path=ppt/slides/slide5.xml><?xml version="1.0" encoding="utf-8"?>
 <p:sld xmlns:a="http://schemas.openxmlformats.org/drawingml/2006/main" xmlns:r="http://schemas.openxmlformats.org/officeDocument/2006/relationships" xmlns:p="http://schemas.openxmlformats.org/presentationml/2006/main">
   <p:cSld>
     <p:spTree>
@@ -13901,13 +15706,8 @@
           <a:p>
             <a:r>
               <a:rPr lang="en-US" dirty="0"/>
-              <a:t>A</a:t>
-            </a:r>
-            <a:r>
-              <a:rPr lang="en-US" dirty="0" smtClean="0"/>
-              <a:t>perture</a:t>
-            </a:r>
-            <a:endParaRPr lang="en-US" dirty="0"/>
+              <a:t>Aperture</a:t>
+            </a:r>
           </a:p>
         </p:txBody>
       </p:sp>
@@ -13924,7 +15724,7 @@
 </p:sld>
 </file>
 
-<file path=ppt/slides/slide5.xml><?xml version="1.0" encoding="utf-8"?>
+<file path=ppt/slides/slide6.xml><?xml version="1.0" encoding="utf-8"?>
 <p:sld xmlns:a="http://schemas.openxmlformats.org/drawingml/2006/main" xmlns:r="http://schemas.openxmlformats.org/officeDocument/2006/relationships" xmlns:p="http://schemas.openxmlformats.org/presentationml/2006/main">
   <p:cSld>
     <p:spTree>
@@ -13986,154 +15786,6 @@
 </p:sld>
 </file>
 
-<file path=ppt/slides/slide6.xml><?xml version="1.0" encoding="utf-8"?>
-<p:sld xmlns:a="http://schemas.openxmlformats.org/drawingml/2006/main" xmlns:r="http://schemas.openxmlformats.org/officeDocument/2006/relationships" xmlns:p="http://schemas.openxmlformats.org/presentationml/2006/main">
-  <p:cSld>
-    <p:spTree>
-      <p:nvGrpSpPr>
-        <p:cNvPr id="1" name=""/>
-        <p:cNvGrpSpPr/>
-        <p:nvPr/>
-      </p:nvGrpSpPr>
-      <p:grpSpPr>
-        <a:xfrm>
-          <a:off x="0" y="0"/>
-          <a:ext cx="0" cy="0"/>
-          <a:chOff x="0" y="0"/>
-          <a:chExt cx="0" cy="0"/>
-        </a:xfrm>
-      </p:grpSpPr>
-      <p:sp>
-        <p:nvSpPr>
-          <p:cNvPr id="2" name="Title 1"/>
-          <p:cNvSpPr>
-            <a:spLocks noGrp="1"/>
-          </p:cNvSpPr>
-          <p:nvPr>
-            <p:ph type="title"/>
-          </p:nvPr>
-        </p:nvSpPr>
-        <p:spPr/>
-        <p:txBody>
-          <a:bodyPr/>
-          <a:lstStyle/>
-          <a:p>
-            <a:r>
-              <a:rPr lang="en-US" dirty="0" smtClean="0"/>
-              <a:t>Question 223.17.4</a:t>
-            </a:r>
-            <a:endParaRPr lang="en-US" dirty="0"/>
-          </a:p>
-        </p:txBody>
-      </p:sp>
-      <p:sp>
-        <p:nvSpPr>
-          <p:cNvPr id="3" name="Content Placeholder 2"/>
-          <p:cNvSpPr>
-            <a:spLocks noGrp="1"/>
-          </p:cNvSpPr>
-          <p:nvPr>
-            <p:ph idx="1"/>
-          </p:nvPr>
-        </p:nvSpPr>
-        <p:spPr/>
-        <p:txBody>
-          <a:bodyPr/>
-          <a:lstStyle/>
-          <a:p>
-            <a:pPr>
-              <a:buNone/>
-            </a:pPr>
-            <a:r>
-              <a:rPr lang="en-US" dirty="0" smtClean="0"/>
-              <a:t>For a camera, usually the object distance is large. If that is true, about how big is the image distance?</a:t>
-            </a:r>
-          </a:p>
-          <a:p>
-            <a:pPr marL="514350" indent="-514350">
-              <a:buFont typeface="+mj-lt"/>
-              <a:buAutoNum type="alphaLcParenR"/>
-            </a:pPr>
-            <a:r>
-              <a:rPr lang="en-US" dirty="0" smtClean="0"/>
-              <a:t>About 10cm</a:t>
-            </a:r>
-          </a:p>
-          <a:p>
-            <a:pPr marL="514350" indent="-514350">
-              <a:buFont typeface="+mj-lt"/>
-              <a:buAutoNum type="alphaLcParenR"/>
-            </a:pPr>
-            <a:r>
-              <a:rPr lang="en-US" dirty="0" smtClean="0"/>
-              <a:t>About as big as the focal length</a:t>
-            </a:r>
-          </a:p>
-          <a:p>
-            <a:pPr marL="514350" indent="-514350">
-              <a:buFont typeface="+mj-lt"/>
-              <a:buAutoNum type="alphaLcParenR"/>
-            </a:pPr>
-            <a:r>
-              <a:rPr lang="en-US" dirty="0" smtClean="0"/>
-              <a:t>About as big as the diameter of the lens</a:t>
-            </a:r>
-          </a:p>
-          <a:p>
-            <a:pPr marL="514350" indent="-514350">
-              <a:buFont typeface="+mj-lt"/>
-              <a:buAutoNum type="alphaLcParenR"/>
-            </a:pPr>
-            <a:r>
-              <a:rPr lang="en-US" dirty="0" smtClean="0"/>
-              <a:t>About as big as the object</a:t>
-            </a:r>
-            <a:endParaRPr lang="en-US" dirty="0"/>
-          </a:p>
-        </p:txBody>
-      </p:sp>
-      <p:sp>
-        <p:nvSpPr>
-          <p:cNvPr id="4" name="Slide Number Placeholder 3"/>
-          <p:cNvSpPr>
-            <a:spLocks noGrp="1"/>
-          </p:cNvSpPr>
-          <p:nvPr>
-            <p:ph type="sldNum" sz="quarter" idx="12"/>
-          </p:nvPr>
-        </p:nvSpPr>
-        <p:spPr/>
-        <p:txBody>
-          <a:bodyPr/>
-          <a:lstStyle/>
-          <a:p>
-            <a:pPr>
-              <a:defRPr/>
-            </a:pPr>
-            <a:fld id="{64137B81-8888-4253-92EC-0AED2A590749}" type="slidenum">
-              <a:rPr lang="en-US" smtClean="0"/>
-              <a:pPr>
-                <a:defRPr/>
-              </a:pPr>
-              <a:t>6</a:t>
-            </a:fld>
-            <a:endParaRPr lang="en-US"/>
-          </a:p>
-        </p:txBody>
-      </p:sp>
-    </p:spTree>
-    <p:extLst>
-      <p:ext uri="{BB962C8B-B14F-4D97-AF65-F5344CB8AC3E}">
-        <p14:creationId xmlns:p14="http://schemas.microsoft.com/office/powerpoint/2010/main" val="3037868831"/>
-      </p:ext>
-    </p:extLst>
-  </p:cSld>
-  <p:clrMapOvr>
-    <a:masterClrMapping/>
-  </p:clrMapOvr>
-</p:sld>
-</file>
-
 <file path=ppt/slides/slide7.xml><?xml version="1.0" encoding="utf-8"?>
 <p:sld xmlns:a="http://schemas.openxmlformats.org/drawingml/2006/main" xmlns:r="http://schemas.openxmlformats.org/officeDocument/2006/relationships" xmlns:p="http://schemas.openxmlformats.org/presentationml/2006/main">
   <p:cSld>
@@ -14167,10 +15819,9 @@
           <a:lstStyle/>
           <a:p>
             <a:r>
-              <a:rPr lang="en-US" dirty="0" smtClean="0"/>
-              <a:t>Question 223.17.5</a:t>
-            </a:r>
-            <a:endParaRPr lang="en-US" dirty="0"/>
+              <a:rPr lang="en-US" dirty="0"/>
+              <a:t>Question 223.17.4</a:t>
+            </a:r>
           </a:p>
         </p:txBody>
       </p:sp>
@@ -14193,8 +15844,8 @@
               <a:buNone/>
             </a:pPr>
             <a:r>
-              <a:rPr lang="en-US" dirty="0" smtClean="0"/>
-              <a:t>For a camera, usually the object distance is large. If that is true, what can we say about the image size?</a:t>
+              <a:rPr lang="en-US" dirty="0"/>
+              <a:t>For a camera, usually the object distance is large. If that is true, about how big is the image distance?</a:t>
             </a:r>
           </a:p>
           <a:p>
@@ -14203,8 +15854,8 @@
               <a:buAutoNum type="alphaLcParenR"/>
             </a:pPr>
             <a:r>
-              <a:rPr lang="en-US" dirty="0" smtClean="0"/>
-              <a:t>It’s 10cm</a:t>
+              <a:rPr lang="en-US" dirty="0"/>
+              <a:t>About 10cm</a:t>
             </a:r>
           </a:p>
           <a:p>
@@ -14213,8 +15864,8 @@
               <a:buAutoNum type="alphaLcParenR"/>
             </a:pPr>
             <a:r>
-              <a:rPr lang="en-US" dirty="0" smtClean="0"/>
-              <a:t>It is proportional to the focal length</a:t>
+              <a:rPr lang="en-US" dirty="0"/>
+              <a:t>About as big as the focal length</a:t>
             </a:r>
           </a:p>
           <a:p>
@@ -14223,8 +15874,8 @@
               <a:buAutoNum type="alphaLcParenR"/>
             </a:pPr>
             <a:r>
-              <a:rPr lang="en-US" dirty="0" smtClean="0"/>
-              <a:t>It is proportional to the diameter of the lens</a:t>
+              <a:rPr lang="en-US" dirty="0"/>
+              <a:t>About as big as the diameter of the lens</a:t>
             </a:r>
           </a:p>
           <a:p>
@@ -14233,10 +15884,9 @@
               <a:buAutoNum type="alphaLcParenR"/>
             </a:pPr>
             <a:r>
-              <a:rPr lang="en-US" dirty="0" smtClean="0"/>
-              <a:t>Nothing</a:t>
-            </a:r>
-            <a:endParaRPr lang="en-US" dirty="0"/>
+              <a:rPr lang="en-US" dirty="0"/>
+              <a:t>About as big as the object</a:t>
+            </a:r>
           </a:p>
         </p:txBody>
       </p:sp>
@@ -14272,7 +15922,7 @@
     </p:spTree>
     <p:extLst>
       <p:ext uri="{BB962C8B-B14F-4D97-AF65-F5344CB8AC3E}">
-        <p14:creationId xmlns:p14="http://schemas.microsoft.com/office/powerpoint/2010/main" val="110867534"/>
+        <p14:creationId xmlns:p14="http://schemas.microsoft.com/office/powerpoint/2010/main" val="3037868831"/>
       </p:ext>
     </p:extLst>
   </p:cSld>
@@ -14315,10 +15965,9 @@
           <a:lstStyle/>
           <a:p>
             <a:r>
-              <a:rPr lang="en-US" dirty="0" smtClean="0"/>
-              <a:t>Question 223.17.6</a:t>
-            </a:r>
-            <a:endParaRPr lang="en-US" dirty="0"/>
+              <a:rPr lang="en-US" dirty="0"/>
+              <a:t>Question 223.17.5</a:t>
+            </a:r>
           </a:p>
         </p:txBody>
       </p:sp>
@@ -14341,8 +15990,8 @@
               <a:buNone/>
             </a:pPr>
             <a:r>
-              <a:rPr lang="en-US" dirty="0" smtClean="0"/>
-              <a:t>For a camera, usually the object distance is large. What can we say about the intensity of the light that strikes the focal plane array?</a:t>
+              <a:rPr lang="en-US" dirty="0"/>
+              <a:t>For a camera, usually the object distance is large. If that is true, what can we say about the image size?</a:t>
             </a:r>
           </a:p>
           <a:p>
@@ -14351,16 +16000,8 @@
               <a:buAutoNum type="alphaLcParenR"/>
             </a:pPr>
             <a:r>
-              <a:rPr lang="en-US" dirty="0" smtClean="0"/>
-              <a:t>It’s 10</a:t>
-            </a:r>
-            <a:r>
-              <a:rPr lang="en-US" baseline="30000" dirty="0" smtClean="0"/>
-              <a:t>2</a:t>
-            </a:r>
-            <a:r>
-              <a:rPr lang="en-US" dirty="0" smtClean="0"/>
-              <a:t>cm</a:t>
+              <a:rPr lang="en-US" dirty="0"/>
+              <a:t>It’s 10cm</a:t>
             </a:r>
           </a:p>
           <a:p>
@@ -14369,8 +16010,8 @@
               <a:buAutoNum type="alphaLcParenR"/>
             </a:pPr>
             <a:r>
-              <a:rPr lang="en-US" dirty="0" smtClean="0"/>
-              <a:t>It is proportional to the focal length squared</a:t>
+              <a:rPr lang="en-US" dirty="0"/>
+              <a:t>It is proportional to the focal length</a:t>
             </a:r>
           </a:p>
           <a:p>
@@ -14379,8 +16020,8 @@
               <a:buAutoNum type="alphaLcParenR"/>
             </a:pPr>
             <a:r>
-              <a:rPr lang="en-US" dirty="0" smtClean="0"/>
-              <a:t>It is proportional to the diameter of the lens squared</a:t>
+              <a:rPr lang="en-US" dirty="0"/>
+              <a:t>It is proportional to the diameter of the lens</a:t>
             </a:r>
           </a:p>
           <a:p>
@@ -14389,10 +16030,9 @@
               <a:buAutoNum type="alphaLcParenR"/>
             </a:pPr>
             <a:r>
-              <a:rPr lang="en-US" dirty="0" smtClean="0"/>
-              <a:t>Nothing squared</a:t>
-            </a:r>
-            <a:endParaRPr lang="en-US" dirty="0"/>
+              <a:rPr lang="en-US" dirty="0"/>
+              <a:t>Nothing</a:t>
+            </a:r>
           </a:p>
         </p:txBody>
       </p:sp>
@@ -14428,7 +16068,7 @@
     </p:spTree>
     <p:extLst>
       <p:ext uri="{BB962C8B-B14F-4D97-AF65-F5344CB8AC3E}">
-        <p14:creationId xmlns:p14="http://schemas.microsoft.com/office/powerpoint/2010/main" val="2094072235"/>
+        <p14:creationId xmlns:p14="http://schemas.microsoft.com/office/powerpoint/2010/main" val="110867534"/>
       </p:ext>
     </p:extLst>
   </p:cSld>
@@ -14472,13 +16112,8 @@
           <a:p>
             <a:r>
               <a:rPr lang="en-US" dirty="0"/>
-              <a:t>Question </a:t>
-            </a:r>
-            <a:r>
-              <a:rPr lang="en-US" dirty="0" smtClean="0"/>
-              <a:t>223.17.6.5</a:t>
-            </a:r>
-            <a:endParaRPr lang="en-US" dirty="0"/>
+              <a:t>Question 223.17.6</a:t>
+            </a:r>
           </a:p>
         </p:txBody>
       </p:sp>
@@ -14502,13 +16137,8 @@
             </a:pPr>
             <a:r>
               <a:rPr lang="en-US" dirty="0"/>
-              <a:t>For a camera, w</a:t>
-            </a:r>
-            <a:r>
-              <a:rPr lang="en-US" dirty="0" smtClean="0"/>
-              <a:t>ill a larger or a smaller aperture let in more light?</a:t>
-            </a:r>
-            <a:endParaRPr lang="en-US" dirty="0"/>
+              <a:t>For a camera, usually the object distance is large. What can we say about the intensity of the light that strikes the focal plane array?</a:t>
+            </a:r>
           </a:p>
           <a:p>
             <a:pPr marL="514350" indent="-514350">
@@ -14516,10 +16146,17 @@
               <a:buAutoNum type="alphaLcParenR"/>
             </a:pPr>
             <a:r>
-              <a:rPr lang="en-US" dirty="0" smtClean="0"/>
-              <a:t>Larger</a:t>
-            </a:r>
-            <a:endParaRPr lang="en-US" dirty="0"/>
+              <a:rPr lang="en-US" dirty="0"/>
+              <a:t>It’s 10</a:t>
+            </a:r>
+            <a:r>
+              <a:rPr lang="en-US" baseline="30000" dirty="0"/>
+              <a:t>2</a:t>
+            </a:r>
+            <a:r>
+              <a:rPr lang="en-US" dirty="0"/>
+              <a:t>cm</a:t>
+            </a:r>
           </a:p>
           <a:p>
             <a:pPr marL="514350" indent="-514350">
@@ -14527,10 +16164,9 @@
               <a:buAutoNum type="alphaLcParenR"/>
             </a:pPr>
             <a:r>
-              <a:rPr lang="en-US" dirty="0" smtClean="0"/>
-              <a:t>Smaller</a:t>
-            </a:r>
-            <a:endParaRPr lang="en-US" dirty="0"/>
+              <a:rPr lang="en-US" dirty="0"/>
+              <a:t>It is proportional to the focal length squared</a:t>
+            </a:r>
           </a:p>
           <a:p>
             <a:pPr marL="514350" indent="-514350">
@@ -14538,10 +16174,19 @@
               <a:buAutoNum type="alphaLcParenR"/>
             </a:pPr>
             <a:r>
-              <a:rPr lang="en-US" dirty="0" smtClean="0"/>
-              <a:t>Impossible to tell</a:t>
-            </a:r>
-            <a:endParaRPr lang="en-US" dirty="0"/>
+              <a:rPr lang="en-US" dirty="0"/>
+              <a:t>It is proportional to the diameter of the lens squared</a:t>
+            </a:r>
+          </a:p>
+          <a:p>
+            <a:pPr marL="514350" indent="-514350">
+              <a:buFont typeface="+mj-lt"/>
+              <a:buAutoNum type="alphaLcParenR"/>
+            </a:pPr>
+            <a:r>
+              <a:rPr lang="en-US" dirty="0"/>
+              <a:t>Nothing squared</a:t>
+            </a:r>
           </a:p>
         </p:txBody>
       </p:sp>
@@ -14577,7 +16222,7 @@
     </p:spTree>
     <p:extLst>
       <p:ext uri="{BB962C8B-B14F-4D97-AF65-F5344CB8AC3E}">
-        <p14:creationId xmlns:p14="http://schemas.microsoft.com/office/powerpoint/2010/main" val="3125088823"/>
+        <p14:creationId xmlns:p14="http://schemas.microsoft.com/office/powerpoint/2010/main" val="2094072235"/>
       </p:ext>
     </p:extLst>
   </p:cSld>

</xml_diff>